<commit_message>
Fixes + lvl 2
</commit_message>
<xml_diff>
--- a/Project Presentation/3140196 - Multimedia technology project presentation.pptx
+++ b/Project Presentation/3140196 - Multimedia technology project presentation.pptx
@@ -8,12 +8,13 @@
     <p:sldId id="256" r:id="rId2"/>
     <p:sldId id="258" r:id="rId3"/>
     <p:sldId id="257" r:id="rId4"/>
-    <p:sldId id="259" r:id="rId5"/>
-    <p:sldId id="260" r:id="rId6"/>
-    <p:sldId id="261" r:id="rId7"/>
-    <p:sldId id="262" r:id="rId8"/>
-    <p:sldId id="263" r:id="rId9"/>
-    <p:sldId id="264" r:id="rId10"/>
+    <p:sldId id="260" r:id="rId5"/>
+    <p:sldId id="261" r:id="rId6"/>
+    <p:sldId id="262" r:id="rId7"/>
+    <p:sldId id="263" r:id="rId8"/>
+    <p:sldId id="264" r:id="rId9"/>
+    <p:sldId id="259" r:id="rId10"/>
+    <p:sldId id="265" r:id="rId11"/>
   </p:sldIdLst>
   <p:sldSz cx="12192000" cy="6858000"/>
   <p:notesSz cx="6858000" cy="9144000"/>
@@ -112,6 +113,11 @@
       </a:defRPr>
     </a:lvl9pPr>
   </p:defaultTextStyle>
+  <p:extLst>
+    <p:ext uri="{EFAFB233-063F-42B5-8137-9DF3F51BA10A}">
+      <p15:sldGuideLst xmlns:p15="http://schemas.microsoft.com/office/powerpoint/2012/main"/>
+    </p:ext>
+  </p:extLst>
 </p:presentation>
 </file>
 
@@ -262,7 +268,7 @@
           <a:p>
             <a:fld id="{F1A87ED4-A69C-400D-BB16-D0DD08EF48BF}" type="datetimeFigureOut">
               <a:rPr lang="en-US" smtClean="0"/>
-              <a:t>1/10/2025</a:t>
+              <a:t>1/11/2025</a:t>
             </a:fld>
             <a:endParaRPr lang="en-US"/>
           </a:p>
@@ -460,7 +466,7 @@
           <a:p>
             <a:fld id="{F1A87ED4-A69C-400D-BB16-D0DD08EF48BF}" type="datetimeFigureOut">
               <a:rPr lang="en-US" smtClean="0"/>
-              <a:t>1/10/2025</a:t>
+              <a:t>1/11/2025</a:t>
             </a:fld>
             <a:endParaRPr lang="en-US"/>
           </a:p>
@@ -668,7 +674,7 @@
           <a:p>
             <a:fld id="{F1A87ED4-A69C-400D-BB16-D0DD08EF48BF}" type="datetimeFigureOut">
               <a:rPr lang="en-US" smtClean="0"/>
-              <a:t>1/10/2025</a:t>
+              <a:t>1/11/2025</a:t>
             </a:fld>
             <a:endParaRPr lang="en-US"/>
           </a:p>
@@ -866,7 +872,7 @@
           <a:p>
             <a:fld id="{F1A87ED4-A69C-400D-BB16-D0DD08EF48BF}" type="datetimeFigureOut">
               <a:rPr lang="en-US" smtClean="0"/>
-              <a:t>1/10/2025</a:t>
+              <a:t>1/11/2025</a:t>
             </a:fld>
             <a:endParaRPr lang="en-US"/>
           </a:p>
@@ -1141,7 +1147,7 @@
           <a:p>
             <a:fld id="{F1A87ED4-A69C-400D-BB16-D0DD08EF48BF}" type="datetimeFigureOut">
               <a:rPr lang="en-US" smtClean="0"/>
-              <a:t>1/10/2025</a:t>
+              <a:t>1/11/2025</a:t>
             </a:fld>
             <a:endParaRPr lang="en-US"/>
           </a:p>
@@ -1406,7 +1412,7 @@
           <a:p>
             <a:fld id="{F1A87ED4-A69C-400D-BB16-D0DD08EF48BF}" type="datetimeFigureOut">
               <a:rPr lang="en-US" smtClean="0"/>
-              <a:t>1/10/2025</a:t>
+              <a:t>1/11/2025</a:t>
             </a:fld>
             <a:endParaRPr lang="en-US"/>
           </a:p>
@@ -1818,7 +1824,7 @@
           <a:p>
             <a:fld id="{F1A87ED4-A69C-400D-BB16-D0DD08EF48BF}" type="datetimeFigureOut">
               <a:rPr lang="en-US" smtClean="0"/>
-              <a:t>1/10/2025</a:t>
+              <a:t>1/11/2025</a:t>
             </a:fld>
             <a:endParaRPr lang="en-US"/>
           </a:p>
@@ -1959,7 +1965,7 @@
           <a:p>
             <a:fld id="{F1A87ED4-A69C-400D-BB16-D0DD08EF48BF}" type="datetimeFigureOut">
               <a:rPr lang="en-US" smtClean="0"/>
-              <a:t>1/10/2025</a:t>
+              <a:t>1/11/2025</a:t>
             </a:fld>
             <a:endParaRPr lang="en-US"/>
           </a:p>
@@ -2072,7 +2078,7 @@
           <a:p>
             <a:fld id="{F1A87ED4-A69C-400D-BB16-D0DD08EF48BF}" type="datetimeFigureOut">
               <a:rPr lang="en-US" smtClean="0"/>
-              <a:t>1/10/2025</a:t>
+              <a:t>1/11/2025</a:t>
             </a:fld>
             <a:endParaRPr lang="en-US"/>
           </a:p>
@@ -2383,7 +2389,7 @@
           <a:p>
             <a:fld id="{F1A87ED4-A69C-400D-BB16-D0DD08EF48BF}" type="datetimeFigureOut">
               <a:rPr lang="en-US" smtClean="0"/>
-              <a:t>1/10/2025</a:t>
+              <a:t>1/11/2025</a:t>
             </a:fld>
             <a:endParaRPr lang="en-US"/>
           </a:p>
@@ -2671,7 +2677,7 @@
           <a:p>
             <a:fld id="{F1A87ED4-A69C-400D-BB16-D0DD08EF48BF}" type="datetimeFigureOut">
               <a:rPr lang="en-US" smtClean="0"/>
-              <a:t>1/10/2025</a:t>
+              <a:t>1/11/2025</a:t>
             </a:fld>
             <a:endParaRPr lang="en-US"/>
           </a:p>
@@ -2921,7 +2927,7 @@
           <a:p>
             <a:fld id="{F1A87ED4-A69C-400D-BB16-D0DD08EF48BF}" type="datetimeFigureOut">
               <a:rPr lang="en-US" smtClean="0"/>
-              <a:t>1/10/2025</a:t>
+              <a:t>1/11/2025</a:t>
             </a:fld>
             <a:endParaRPr lang="en-US"/>
           </a:p>
@@ -3460,6 +3466,96 @@
 </p:sld>
 </file>
 
+<file path=ppt/slides/slide10.xml><?xml version="1.0" encoding="utf-8"?>
+<p:sld xmlns:a="http://schemas.openxmlformats.org/drawingml/2006/main" xmlns:r="http://schemas.openxmlformats.org/officeDocument/2006/relationships" xmlns:p="http://schemas.openxmlformats.org/presentationml/2006/main">
+  <p:cSld>
+    <p:bg>
+      <p:bgPr>
+        <a:blipFill dpi="0" rotWithShape="1">
+          <a:blip r:embed="rId2">
+            <a:lum/>
+          </a:blip>
+          <a:srcRect/>
+          <a:stretch>
+            <a:fillRect/>
+          </a:stretch>
+        </a:blipFill>
+        <a:effectLst/>
+      </p:bgPr>
+    </p:bg>
+    <p:spTree>
+      <p:nvGrpSpPr>
+        <p:cNvPr id="1" name="">
+          <a:extLst>
+            <a:ext uri="{FF2B5EF4-FFF2-40B4-BE49-F238E27FC236}">
+              <a16:creationId xmlns:a16="http://schemas.microsoft.com/office/drawing/2014/main" id="{D4A6B037-2F2B-C495-71E2-3C32DD3D766B}"/>
+            </a:ext>
+          </a:extLst>
+        </p:cNvPr>
+        <p:cNvGrpSpPr/>
+        <p:nvPr/>
+      </p:nvGrpSpPr>
+      <p:grpSpPr>
+        <a:xfrm>
+          <a:off x="0" y="0"/>
+          <a:ext cx="0" cy="0"/>
+          <a:chOff x="0" y="0"/>
+          <a:chExt cx="0" cy="0"/>
+        </a:xfrm>
+      </p:grpSpPr>
+      <p:sp>
+        <p:nvSpPr>
+          <p:cNvPr id="2" name="Title 1">
+            <a:extLst>
+              <a:ext uri="{FF2B5EF4-FFF2-40B4-BE49-F238E27FC236}">
+                <a16:creationId xmlns:a16="http://schemas.microsoft.com/office/drawing/2014/main" id="{6F3DC7BA-0593-1294-131C-C7E6BCC74C90}"/>
+              </a:ext>
+            </a:extLst>
+          </p:cNvPr>
+          <p:cNvSpPr>
+            <a:spLocks noGrp="1"/>
+          </p:cNvSpPr>
+          <p:nvPr>
+            <p:ph type="ctrTitle"/>
+          </p:nvPr>
+        </p:nvSpPr>
+        <p:spPr>
+          <a:xfrm>
+            <a:off x="1524000" y="1122363"/>
+            <a:ext cx="9144000" cy="477837"/>
+          </a:xfrm>
+        </p:spPr>
+        <p:txBody>
+          <a:bodyPr>
+            <a:noAutofit/>
+          </a:bodyPr>
+          <a:lstStyle/>
+          <a:p>
+            <a:r>
+              <a:rPr lang="en-US" sz="3200" dirty="0">
+                <a:solidFill>
+                  <a:srgbClr val="FFE81E"/>
+                </a:solidFill>
+                <a:latin typeface="StarJedi Special Edition" panose="040B0000000000000000" pitchFamily="82" charset="0"/>
+              </a:rPr>
+              <a:t>questions?</a:t>
+            </a:r>
+          </a:p>
+        </p:txBody>
+      </p:sp>
+    </p:spTree>
+    <p:extLst>
+      <p:ext uri="{BB962C8B-B14F-4D97-AF65-F5344CB8AC3E}">
+        <p14:creationId xmlns:p14="http://schemas.microsoft.com/office/powerpoint/2010/main" val="2024537298"/>
+      </p:ext>
+    </p:extLst>
+  </p:cSld>
+  <p:clrMapOvr>
+    <a:masterClrMapping/>
+  </p:clrMapOvr>
+</p:sld>
+</file>
+
 <file path=ppt/slides/slide2.xml><?xml version="1.0" encoding="utf-8"?>
 <p:sld xmlns:a="http://schemas.openxmlformats.org/drawingml/2006/main" xmlns:r="http://schemas.openxmlformats.org/officeDocument/2006/relationships" xmlns:p="http://schemas.openxmlformats.org/presentationml/2006/main">
   <p:cSld>
@@ -3589,7 +3685,7 @@
                 </a:solidFill>
                 <a:latin typeface="StarJedi Special Edition" panose="040B0000000000000000" pitchFamily="82" charset="0"/>
               </a:rPr>
-              <a:t>resources - Tools</a:t>
+              <a:t>player</a:t>
             </a:r>
           </a:p>
           <a:p>
@@ -3604,7 +3700,7 @@
                 </a:solidFill>
                 <a:latin typeface="StarJedi Special Edition" panose="040B0000000000000000" pitchFamily="82" charset="0"/>
               </a:rPr>
-              <a:t>player</a:t>
+              <a:t>Enemies</a:t>
             </a:r>
           </a:p>
           <a:p>
@@ -3619,7 +3715,7 @@
                 </a:solidFill>
                 <a:latin typeface="StarJedi Special Edition" panose="040B0000000000000000" pitchFamily="82" charset="0"/>
               </a:rPr>
-              <a:t>Enemies</a:t>
+              <a:t>objects</a:t>
             </a:r>
           </a:p>
           <a:p>
@@ -3634,7 +3730,7 @@
                 </a:solidFill>
                 <a:latin typeface="StarJedi Special Edition" panose="040B0000000000000000" pitchFamily="82" charset="0"/>
               </a:rPr>
-              <a:t>objects</a:t>
+              <a:t>Scenes</a:t>
             </a:r>
           </a:p>
           <a:p>
@@ -3649,7 +3745,7 @@
                 </a:solidFill>
                 <a:latin typeface="StarJedi Special Edition" panose="040B0000000000000000" pitchFamily="82" charset="0"/>
               </a:rPr>
-              <a:t>Scenes</a:t>
+              <a:t>Game features</a:t>
             </a:r>
           </a:p>
           <a:p>
@@ -3664,7 +3760,19 @@
                 </a:solidFill>
                 <a:latin typeface="StarJedi Special Edition" panose="040B0000000000000000" pitchFamily="82" charset="0"/>
               </a:rPr>
-              <a:t>Game features</a:t>
+              <a:t>resources - Tools</a:t>
+            </a:r>
+          </a:p>
+          <a:p>
+            <a:pPr algn="l"/>
+            <a:r>
+              <a:rPr lang="en-US" dirty="0">
+                <a:solidFill>
+                  <a:srgbClr val="FFE81E"/>
+                </a:solidFill>
+                <a:latin typeface="StarJedi Special Edition" panose="040B0000000000000000" pitchFamily="82" charset="0"/>
+              </a:rPr>
+              <a:t>8. questions</a:t>
             </a:r>
           </a:p>
         </p:txBody>
@@ -3819,7 +3927,7 @@
                 </a:solidFill>
                 <a:latin typeface="StarJedi Special Edition" panose="040B0000000000000000" pitchFamily="82" charset="0"/>
               </a:rPr>
-              <a:t>The hero will be a ragged figure with a glowing sword (Jedi), who will be fighting figures with whole-body white full armors (Clones) in three different levels.</a:t>
+              <a:t>The hero will be a ragged figure with a glowing sword (Jedi), who will be fighting figures with full white whole-body armor (Clones) in three different levels.</a:t>
             </a:r>
           </a:p>
           <a:p>
@@ -3886,6 +3994,1156 @@
 </file>
 
 <file path=ppt/slides/slide4.xml><?xml version="1.0" encoding="utf-8"?>
+<p:sld xmlns:a="http://schemas.openxmlformats.org/drawingml/2006/main" xmlns:r="http://schemas.openxmlformats.org/officeDocument/2006/relationships" xmlns:p="http://schemas.openxmlformats.org/presentationml/2006/main">
+  <p:cSld>
+    <p:bg>
+      <p:bgPr>
+        <a:blipFill dpi="0" rotWithShape="1">
+          <a:blip r:embed="rId2">
+            <a:lum/>
+          </a:blip>
+          <a:srcRect/>
+          <a:stretch>
+            <a:fillRect/>
+          </a:stretch>
+        </a:blipFill>
+        <a:effectLst/>
+      </p:bgPr>
+    </p:bg>
+    <p:spTree>
+      <p:nvGrpSpPr>
+        <p:cNvPr id="1" name="">
+          <a:extLst>
+            <a:ext uri="{FF2B5EF4-FFF2-40B4-BE49-F238E27FC236}">
+              <a16:creationId xmlns:a16="http://schemas.microsoft.com/office/drawing/2014/main" id="{64801EC1-926D-6B87-7D50-E5BB0D18EDB9}"/>
+            </a:ext>
+          </a:extLst>
+        </p:cNvPr>
+        <p:cNvGrpSpPr/>
+        <p:nvPr/>
+      </p:nvGrpSpPr>
+      <p:grpSpPr>
+        <a:xfrm>
+          <a:off x="0" y="0"/>
+          <a:ext cx="0" cy="0"/>
+          <a:chOff x="0" y="0"/>
+          <a:chExt cx="0" cy="0"/>
+        </a:xfrm>
+      </p:grpSpPr>
+      <p:sp>
+        <p:nvSpPr>
+          <p:cNvPr id="2" name="Title 1">
+            <a:extLst>
+              <a:ext uri="{FF2B5EF4-FFF2-40B4-BE49-F238E27FC236}">
+                <a16:creationId xmlns:a16="http://schemas.microsoft.com/office/drawing/2014/main" id="{F129860C-8D0A-E12D-5D15-26A73529703C}"/>
+              </a:ext>
+            </a:extLst>
+          </p:cNvPr>
+          <p:cNvSpPr>
+            <a:spLocks noGrp="1"/>
+          </p:cNvSpPr>
+          <p:nvPr>
+            <p:ph type="ctrTitle"/>
+          </p:nvPr>
+        </p:nvSpPr>
+        <p:spPr>
+          <a:xfrm>
+            <a:off x="1524000" y="1122363"/>
+            <a:ext cx="9144000" cy="477837"/>
+          </a:xfrm>
+        </p:spPr>
+        <p:txBody>
+          <a:bodyPr>
+            <a:noAutofit/>
+          </a:bodyPr>
+          <a:lstStyle/>
+          <a:p>
+            <a:r>
+              <a:rPr lang="en-US" sz="3200" dirty="0">
+                <a:solidFill>
+                  <a:srgbClr val="FFE81E"/>
+                </a:solidFill>
+                <a:latin typeface="StarJedi Special Edition" panose="040B0000000000000000" pitchFamily="82" charset="0"/>
+              </a:rPr>
+              <a:t>player</a:t>
+            </a:r>
+          </a:p>
+        </p:txBody>
+      </p:sp>
+      <p:sp>
+        <p:nvSpPr>
+          <p:cNvPr id="3" name="Subtitle 2">
+            <a:extLst>
+              <a:ext uri="{FF2B5EF4-FFF2-40B4-BE49-F238E27FC236}">
+                <a16:creationId xmlns:a16="http://schemas.microsoft.com/office/drawing/2014/main" id="{444E297B-718F-F0DA-D4AF-46E7796FC36D}"/>
+              </a:ext>
+            </a:extLst>
+          </p:cNvPr>
+          <p:cNvSpPr>
+            <a:spLocks noGrp="1"/>
+          </p:cNvSpPr>
+          <p:nvPr>
+            <p:ph type="subTitle" idx="1"/>
+          </p:nvPr>
+        </p:nvSpPr>
+        <p:spPr>
+          <a:xfrm>
+            <a:off x="1524000" y="1662023"/>
+            <a:ext cx="9144000" cy="1570007"/>
+          </a:xfrm>
+        </p:spPr>
+        <p:txBody>
+          <a:bodyPr>
+            <a:noAutofit/>
+          </a:bodyPr>
+          <a:lstStyle/>
+          <a:p>
+            <a:pPr marL="285750" indent="-285750" algn="l">
+              <a:buFont typeface="Arial" panose="020B0604020202020204" pitchFamily="34" charset="0"/>
+              <a:buChar char="•"/>
+            </a:pPr>
+            <a:r>
+              <a:rPr lang="en-US" sz="1600" dirty="0">
+                <a:solidFill>
+                  <a:srgbClr val="FFE81E"/>
+                </a:solidFill>
+                <a:latin typeface="StarJedi Special Edition" panose="040B0000000000000000" pitchFamily="82" charset="0"/>
+              </a:rPr>
+              <a:t>Moves with both the keyboard arrows and the w-a-s-d combination</a:t>
+            </a:r>
+          </a:p>
+          <a:p>
+            <a:pPr marL="285750" indent="-285750" algn="l">
+              <a:buFont typeface="Arial" panose="020B0604020202020204" pitchFamily="34" charset="0"/>
+              <a:buChar char="•"/>
+            </a:pPr>
+            <a:r>
+              <a:rPr lang="en-US" sz="1600" dirty="0">
+                <a:solidFill>
+                  <a:srgbClr val="FFE81E"/>
+                </a:solidFill>
+                <a:latin typeface="StarJedi Special Edition" panose="040B0000000000000000" pitchFamily="82" charset="0"/>
+              </a:rPr>
+              <a:t>jumps with the spacebar</a:t>
+            </a:r>
+          </a:p>
+          <a:p>
+            <a:pPr marL="285750" indent="-285750" algn="l">
+              <a:buFont typeface="Arial" panose="020B0604020202020204" pitchFamily="34" charset="0"/>
+              <a:buChar char="•"/>
+            </a:pPr>
+            <a:r>
+              <a:rPr lang="en-US" sz="1600" dirty="0">
+                <a:solidFill>
+                  <a:srgbClr val="FFE81E"/>
+                </a:solidFill>
+                <a:latin typeface="StarJedi Special Edition" panose="040B0000000000000000" pitchFamily="82" charset="0"/>
+              </a:rPr>
+              <a:t>Performs attack action with the “h” physical key</a:t>
+            </a:r>
+          </a:p>
+          <a:p>
+            <a:pPr marL="285750" indent="-285750" algn="l">
+              <a:buFont typeface="Arial" panose="020B0604020202020204" pitchFamily="34" charset="0"/>
+              <a:buChar char="•"/>
+            </a:pPr>
+            <a:r>
+              <a:rPr lang="en-US" sz="1600" dirty="0">
+                <a:solidFill>
+                  <a:srgbClr val="FFE81E"/>
+                </a:solidFill>
+                <a:latin typeface="StarJedi Special Edition" panose="040B0000000000000000" pitchFamily="82" charset="0"/>
+              </a:rPr>
+              <a:t>Defends enemy fire with the “p” physical key</a:t>
+            </a:r>
+          </a:p>
+        </p:txBody>
+      </p:sp>
+      <p:pic>
+        <p:nvPicPr>
+          <p:cNvPr id="7" name="Picture 6" descr="A person holding a light sword&#10;&#10;Description automatically generated">
+            <a:extLst>
+              <a:ext uri="{FF2B5EF4-FFF2-40B4-BE49-F238E27FC236}">
+                <a16:creationId xmlns:a16="http://schemas.microsoft.com/office/drawing/2014/main" id="{BD70554F-01ED-5DDE-FF98-148BE283B442}"/>
+              </a:ext>
+            </a:extLst>
+          </p:cNvPr>
+          <p:cNvPicPr>
+            <a:picLocks noChangeAspect="1"/>
+          </p:cNvPicPr>
+          <p:nvPr/>
+        </p:nvPicPr>
+        <p:blipFill>
+          <a:blip r:embed="rId3">
+            <a:extLst>
+              <a:ext uri="{28A0092B-C50C-407E-A947-70E740481C1C}">
+                <a14:useLocalDpi xmlns:a14="http://schemas.microsoft.com/office/drawing/2010/main" val="0"/>
+              </a:ext>
+            </a:extLst>
+          </a:blip>
+          <a:stretch>
+            <a:fillRect/>
+          </a:stretch>
+        </p:blipFill>
+        <p:spPr>
+          <a:xfrm>
+            <a:off x="4756114" y="2946657"/>
+            <a:ext cx="2679772" cy="2994067"/>
+          </a:xfrm>
+          <a:prstGeom prst="rect">
+            <a:avLst/>
+          </a:prstGeom>
+        </p:spPr>
+      </p:pic>
+    </p:spTree>
+    <p:extLst>
+      <p:ext uri="{BB962C8B-B14F-4D97-AF65-F5344CB8AC3E}">
+        <p14:creationId xmlns:p14="http://schemas.microsoft.com/office/powerpoint/2010/main" val="2629288263"/>
+      </p:ext>
+    </p:extLst>
+  </p:cSld>
+  <p:clrMapOvr>
+    <a:masterClrMapping/>
+  </p:clrMapOvr>
+</p:sld>
+</file>
+
+<file path=ppt/slides/slide5.xml><?xml version="1.0" encoding="utf-8"?>
+<p:sld xmlns:a="http://schemas.openxmlformats.org/drawingml/2006/main" xmlns:r="http://schemas.openxmlformats.org/officeDocument/2006/relationships" xmlns:p="http://schemas.openxmlformats.org/presentationml/2006/main">
+  <p:cSld>
+    <p:bg>
+      <p:bgPr>
+        <a:blipFill dpi="0" rotWithShape="1">
+          <a:blip r:embed="rId2">
+            <a:lum/>
+          </a:blip>
+          <a:srcRect/>
+          <a:stretch>
+            <a:fillRect/>
+          </a:stretch>
+        </a:blipFill>
+        <a:effectLst/>
+      </p:bgPr>
+    </p:bg>
+    <p:spTree>
+      <p:nvGrpSpPr>
+        <p:cNvPr id="1" name="">
+          <a:extLst>
+            <a:ext uri="{FF2B5EF4-FFF2-40B4-BE49-F238E27FC236}">
+              <a16:creationId xmlns:a16="http://schemas.microsoft.com/office/drawing/2014/main" id="{DC3ADE69-1B1D-F35A-297A-54653D57E70F}"/>
+            </a:ext>
+          </a:extLst>
+        </p:cNvPr>
+        <p:cNvGrpSpPr/>
+        <p:nvPr/>
+      </p:nvGrpSpPr>
+      <p:grpSpPr>
+        <a:xfrm>
+          <a:off x="0" y="0"/>
+          <a:ext cx="0" cy="0"/>
+          <a:chOff x="0" y="0"/>
+          <a:chExt cx="0" cy="0"/>
+        </a:xfrm>
+      </p:grpSpPr>
+      <p:sp>
+        <p:nvSpPr>
+          <p:cNvPr id="2" name="Title 1">
+            <a:extLst>
+              <a:ext uri="{FF2B5EF4-FFF2-40B4-BE49-F238E27FC236}">
+                <a16:creationId xmlns:a16="http://schemas.microsoft.com/office/drawing/2014/main" id="{D95F532A-BD46-19A7-316C-966E1FB491AB}"/>
+              </a:ext>
+            </a:extLst>
+          </p:cNvPr>
+          <p:cNvSpPr>
+            <a:spLocks noGrp="1"/>
+          </p:cNvSpPr>
+          <p:nvPr>
+            <p:ph type="ctrTitle"/>
+          </p:nvPr>
+        </p:nvSpPr>
+        <p:spPr>
+          <a:xfrm>
+            <a:off x="1524000" y="1122363"/>
+            <a:ext cx="9144000" cy="477837"/>
+          </a:xfrm>
+        </p:spPr>
+        <p:txBody>
+          <a:bodyPr>
+            <a:noAutofit/>
+          </a:bodyPr>
+          <a:lstStyle/>
+          <a:p>
+            <a:r>
+              <a:rPr lang="en-US" sz="3200" dirty="0">
+                <a:solidFill>
+                  <a:srgbClr val="FFE81E"/>
+                </a:solidFill>
+                <a:latin typeface="StarJedi Special Edition" panose="040B0000000000000000" pitchFamily="82" charset="0"/>
+              </a:rPr>
+              <a:t>enemies</a:t>
+            </a:r>
+          </a:p>
+        </p:txBody>
+      </p:sp>
+      <p:sp>
+        <p:nvSpPr>
+          <p:cNvPr id="3" name="Subtitle 2">
+            <a:extLst>
+              <a:ext uri="{FF2B5EF4-FFF2-40B4-BE49-F238E27FC236}">
+                <a16:creationId xmlns:a16="http://schemas.microsoft.com/office/drawing/2014/main" id="{C0E0E21A-27D4-22FF-1856-85E511754513}"/>
+              </a:ext>
+            </a:extLst>
+          </p:cNvPr>
+          <p:cNvSpPr>
+            <a:spLocks noGrp="1"/>
+          </p:cNvSpPr>
+          <p:nvPr>
+            <p:ph type="subTitle" idx="1"/>
+          </p:nvPr>
+        </p:nvSpPr>
+        <p:spPr>
+          <a:xfrm>
+            <a:off x="1524000" y="1662023"/>
+            <a:ext cx="9144000" cy="1570007"/>
+          </a:xfrm>
+        </p:spPr>
+        <p:txBody>
+          <a:bodyPr>
+            <a:noAutofit/>
+          </a:bodyPr>
+          <a:lstStyle/>
+          <a:p>
+            <a:pPr marL="285750" indent="-285750" algn="l">
+              <a:buFont typeface="Arial" panose="020B0604020202020204" pitchFamily="34" charset="0"/>
+              <a:buChar char="•"/>
+            </a:pPr>
+            <a:r>
+              <a:rPr lang="en-US" sz="1600" dirty="0">
+                <a:solidFill>
+                  <a:srgbClr val="FFE81E"/>
+                </a:solidFill>
+                <a:latin typeface="StarJedi Special Edition" panose="040B0000000000000000" pitchFamily="82" charset="0"/>
+              </a:rPr>
+              <a:t>Chases our player on the x-axis, when he enters the detection area</a:t>
+            </a:r>
+          </a:p>
+          <a:p>
+            <a:pPr marL="285750" indent="-285750" algn="l">
+              <a:buFont typeface="Arial" panose="020B0604020202020204" pitchFamily="34" charset="0"/>
+              <a:buChar char="•"/>
+            </a:pPr>
+            <a:r>
+              <a:rPr lang="en-US" sz="1600" dirty="0">
+                <a:solidFill>
+                  <a:srgbClr val="FFE81E"/>
+                </a:solidFill>
+                <a:latin typeface="StarJedi Special Edition" panose="040B0000000000000000" pitchFamily="82" charset="0"/>
+              </a:rPr>
+              <a:t>Shoots laser blast every 1.5 seconds</a:t>
+            </a:r>
+          </a:p>
+          <a:p>
+            <a:pPr marL="285750" indent="-285750" algn="l">
+              <a:buFont typeface="Arial" panose="020B0604020202020204" pitchFamily="34" charset="0"/>
+              <a:buChar char="•"/>
+            </a:pPr>
+            <a:r>
+              <a:rPr lang="en-US" sz="1600" dirty="0">
+                <a:solidFill>
+                  <a:srgbClr val="FFE81E"/>
+                </a:solidFill>
+                <a:latin typeface="StarJedi Special Edition" panose="040B0000000000000000" pitchFamily="82" charset="0"/>
+              </a:rPr>
+              <a:t>Captures player (reduces player’s health by entering his detection area)</a:t>
+            </a:r>
+          </a:p>
+        </p:txBody>
+      </p:sp>
+      <p:pic>
+        <p:nvPicPr>
+          <p:cNvPr id="5" name="Picture 4" descr="A video game character holding an object&#10;&#10;Description automatically generated">
+            <a:extLst>
+              <a:ext uri="{FF2B5EF4-FFF2-40B4-BE49-F238E27FC236}">
+                <a16:creationId xmlns:a16="http://schemas.microsoft.com/office/drawing/2014/main" id="{38DBB877-F718-CAE8-F6DC-5EF6FE43E9D3}"/>
+              </a:ext>
+            </a:extLst>
+          </p:cNvPr>
+          <p:cNvPicPr>
+            <a:picLocks noChangeAspect="1"/>
+          </p:cNvPicPr>
+          <p:nvPr/>
+        </p:nvPicPr>
+        <p:blipFill>
+          <a:blip r:embed="rId3">
+            <a:extLst>
+              <a:ext uri="{28A0092B-C50C-407E-A947-70E740481C1C}">
+                <a14:useLocalDpi xmlns:a14="http://schemas.microsoft.com/office/drawing/2010/main" val="0"/>
+              </a:ext>
+            </a:extLst>
+          </a:blip>
+          <a:stretch>
+            <a:fillRect/>
+          </a:stretch>
+        </p:blipFill>
+        <p:spPr>
+          <a:xfrm>
+            <a:off x="5238322" y="3295179"/>
+            <a:ext cx="1715355" cy="1900798"/>
+          </a:xfrm>
+          <a:prstGeom prst="rect">
+            <a:avLst/>
+          </a:prstGeom>
+        </p:spPr>
+      </p:pic>
+    </p:spTree>
+    <p:extLst>
+      <p:ext uri="{BB962C8B-B14F-4D97-AF65-F5344CB8AC3E}">
+        <p14:creationId xmlns:p14="http://schemas.microsoft.com/office/powerpoint/2010/main" val="3838757829"/>
+      </p:ext>
+    </p:extLst>
+  </p:cSld>
+  <p:clrMapOvr>
+    <a:masterClrMapping/>
+  </p:clrMapOvr>
+</p:sld>
+</file>
+
+<file path=ppt/slides/slide6.xml><?xml version="1.0" encoding="utf-8"?>
+<p:sld xmlns:a="http://schemas.openxmlformats.org/drawingml/2006/main" xmlns:r="http://schemas.openxmlformats.org/officeDocument/2006/relationships" xmlns:p="http://schemas.openxmlformats.org/presentationml/2006/main">
+  <p:cSld>
+    <p:bg>
+      <p:bgPr>
+        <a:blipFill dpi="0" rotWithShape="1">
+          <a:blip r:embed="rId2">
+            <a:lum/>
+          </a:blip>
+          <a:srcRect/>
+          <a:stretch>
+            <a:fillRect/>
+          </a:stretch>
+        </a:blipFill>
+        <a:effectLst/>
+      </p:bgPr>
+    </p:bg>
+    <p:spTree>
+      <p:nvGrpSpPr>
+        <p:cNvPr id="1" name="">
+          <a:extLst>
+            <a:ext uri="{FF2B5EF4-FFF2-40B4-BE49-F238E27FC236}">
+              <a16:creationId xmlns:a16="http://schemas.microsoft.com/office/drawing/2014/main" id="{8644568B-24D3-4850-CF6A-B1144CCBBD23}"/>
+            </a:ext>
+          </a:extLst>
+        </p:cNvPr>
+        <p:cNvGrpSpPr/>
+        <p:nvPr/>
+      </p:nvGrpSpPr>
+      <p:grpSpPr>
+        <a:xfrm>
+          <a:off x="0" y="0"/>
+          <a:ext cx="0" cy="0"/>
+          <a:chOff x="0" y="0"/>
+          <a:chExt cx="0" cy="0"/>
+        </a:xfrm>
+      </p:grpSpPr>
+      <p:sp>
+        <p:nvSpPr>
+          <p:cNvPr id="2" name="Title 1">
+            <a:extLst>
+              <a:ext uri="{FF2B5EF4-FFF2-40B4-BE49-F238E27FC236}">
+                <a16:creationId xmlns:a16="http://schemas.microsoft.com/office/drawing/2014/main" id="{F2575D94-5C93-D011-5445-6436FBE70C8B}"/>
+              </a:ext>
+            </a:extLst>
+          </p:cNvPr>
+          <p:cNvSpPr>
+            <a:spLocks noGrp="1"/>
+          </p:cNvSpPr>
+          <p:nvPr>
+            <p:ph type="ctrTitle"/>
+          </p:nvPr>
+        </p:nvSpPr>
+        <p:spPr>
+          <a:xfrm>
+            <a:off x="1524000" y="1122363"/>
+            <a:ext cx="9144000" cy="477837"/>
+          </a:xfrm>
+        </p:spPr>
+        <p:txBody>
+          <a:bodyPr>
+            <a:noAutofit/>
+          </a:bodyPr>
+          <a:lstStyle/>
+          <a:p>
+            <a:r>
+              <a:rPr lang="en-US" sz="3200" dirty="0">
+                <a:solidFill>
+                  <a:srgbClr val="FFE81E"/>
+                </a:solidFill>
+                <a:latin typeface="StarJedi Special Edition" panose="040B0000000000000000" pitchFamily="82" charset="0"/>
+              </a:rPr>
+              <a:t>objects</a:t>
+            </a:r>
+          </a:p>
+        </p:txBody>
+      </p:sp>
+      <p:sp>
+        <p:nvSpPr>
+          <p:cNvPr id="3" name="Subtitle 2">
+            <a:extLst>
+              <a:ext uri="{FF2B5EF4-FFF2-40B4-BE49-F238E27FC236}">
+                <a16:creationId xmlns:a16="http://schemas.microsoft.com/office/drawing/2014/main" id="{5B379621-8FF0-5574-8FAF-2B2FA4310C93}"/>
+              </a:ext>
+            </a:extLst>
+          </p:cNvPr>
+          <p:cNvSpPr>
+            <a:spLocks noGrp="1"/>
+          </p:cNvSpPr>
+          <p:nvPr>
+            <p:ph type="subTitle" idx="1"/>
+          </p:nvPr>
+        </p:nvSpPr>
+        <p:spPr>
+          <a:xfrm>
+            <a:off x="1524000" y="1662023"/>
+            <a:ext cx="9144000" cy="1570007"/>
+          </a:xfrm>
+        </p:spPr>
+        <p:txBody>
+          <a:bodyPr>
+            <a:noAutofit/>
+          </a:bodyPr>
+          <a:lstStyle/>
+          <a:p>
+            <a:pPr marL="285750" indent="-285750" algn="l">
+              <a:buFont typeface="Arial" panose="020B0604020202020204" pitchFamily="34" charset="0"/>
+              <a:buChar char="•"/>
+            </a:pPr>
+            <a:r>
+              <a:rPr lang="en-US" sz="1600" dirty="0">
+                <a:solidFill>
+                  <a:srgbClr val="FFE81E"/>
+                </a:solidFill>
+                <a:latin typeface="StarJedi Special Edition" panose="040B0000000000000000" pitchFamily="82" charset="0"/>
+              </a:rPr>
+              <a:t>Laser beam: THE product of enemy’s offensive blast</a:t>
+            </a:r>
+          </a:p>
+          <a:p>
+            <a:pPr marL="285750" indent="-285750" algn="l">
+              <a:buFont typeface="Arial" panose="020B0604020202020204" pitchFamily="34" charset="0"/>
+              <a:buChar char="•"/>
+            </a:pPr>
+            <a:r>
+              <a:rPr lang="en-US" sz="1600" dirty="0">
+                <a:solidFill>
+                  <a:srgbClr val="FFE81E"/>
+                </a:solidFill>
+                <a:latin typeface="StarJedi Special Edition" panose="040B0000000000000000" pitchFamily="82" charset="0"/>
+              </a:rPr>
+              <a:t>Spacecraft: the getaway vehicle</a:t>
+            </a:r>
+          </a:p>
+          <a:p>
+            <a:pPr marL="285750" indent="-285750" algn="l">
+              <a:buFont typeface="Arial" panose="020B0604020202020204" pitchFamily="34" charset="0"/>
+              <a:buChar char="•"/>
+            </a:pPr>
+            <a:r>
+              <a:rPr lang="en-US" sz="1600" dirty="0">
+                <a:solidFill>
+                  <a:srgbClr val="FFE81E"/>
+                </a:solidFill>
+                <a:latin typeface="StarJedi Special Edition" panose="040B0000000000000000" pitchFamily="82" charset="0"/>
+              </a:rPr>
+              <a:t>Collectables: the main objective</a:t>
+            </a:r>
+          </a:p>
+        </p:txBody>
+      </p:sp>
+      <p:pic>
+        <p:nvPicPr>
+          <p:cNvPr id="6" name="Picture 5" descr="A red light in the dark&#10;&#10;Description automatically generated">
+            <a:extLst>
+              <a:ext uri="{FF2B5EF4-FFF2-40B4-BE49-F238E27FC236}">
+                <a16:creationId xmlns:a16="http://schemas.microsoft.com/office/drawing/2014/main" id="{0CABE5EE-9E0C-3EAF-4A6E-0DAE6601FEBD}"/>
+              </a:ext>
+            </a:extLst>
+          </p:cNvPr>
+          <p:cNvPicPr>
+            <a:picLocks noChangeAspect="1"/>
+          </p:cNvPicPr>
+          <p:nvPr/>
+        </p:nvPicPr>
+        <p:blipFill>
+          <a:blip r:embed="rId3">
+            <a:extLst>
+              <a:ext uri="{28A0092B-C50C-407E-A947-70E740481C1C}">
+                <a14:useLocalDpi xmlns:a14="http://schemas.microsoft.com/office/drawing/2010/main" val="0"/>
+              </a:ext>
+            </a:extLst>
+          </a:blip>
+          <a:stretch>
+            <a:fillRect/>
+          </a:stretch>
+        </p:blipFill>
+        <p:spPr>
+          <a:xfrm>
+            <a:off x="2299388" y="3429000"/>
+            <a:ext cx="1209675" cy="1171575"/>
+          </a:xfrm>
+          <a:prstGeom prst="rect">
+            <a:avLst/>
+          </a:prstGeom>
+        </p:spPr>
+      </p:pic>
+      <p:pic>
+        <p:nvPicPr>
+          <p:cNvPr id="8" name="Picture 7">
+            <a:extLst>
+              <a:ext uri="{FF2B5EF4-FFF2-40B4-BE49-F238E27FC236}">
+                <a16:creationId xmlns:a16="http://schemas.microsoft.com/office/drawing/2014/main" id="{72B6DAB2-D222-8CC7-9DDB-126A5BE685B4}"/>
+              </a:ext>
+            </a:extLst>
+          </p:cNvPr>
+          <p:cNvPicPr>
+            <a:picLocks noChangeAspect="1"/>
+          </p:cNvPicPr>
+          <p:nvPr/>
+        </p:nvPicPr>
+        <p:blipFill>
+          <a:blip r:embed="rId4">
+            <a:extLst>
+              <a:ext uri="{28A0092B-C50C-407E-A947-70E740481C1C}">
+                <a14:useLocalDpi xmlns:a14="http://schemas.microsoft.com/office/drawing/2010/main" val="0"/>
+              </a:ext>
+            </a:extLst>
+          </a:blip>
+          <a:stretch>
+            <a:fillRect/>
+          </a:stretch>
+        </p:blipFill>
+        <p:spPr>
+          <a:xfrm>
+            <a:off x="4893560" y="3625971"/>
+            <a:ext cx="2404880" cy="883845"/>
+          </a:xfrm>
+          <a:prstGeom prst="rect">
+            <a:avLst/>
+          </a:prstGeom>
+        </p:spPr>
+      </p:pic>
+      <p:pic>
+        <p:nvPicPr>
+          <p:cNvPr id="10" name="Picture 9" descr="A black and yellow space ship&#10;&#10;Description automatically generated">
+            <a:extLst>
+              <a:ext uri="{FF2B5EF4-FFF2-40B4-BE49-F238E27FC236}">
+                <a16:creationId xmlns:a16="http://schemas.microsoft.com/office/drawing/2014/main" id="{9DD762E0-1B66-B6DE-2818-D2B632A0ADC5}"/>
+              </a:ext>
+            </a:extLst>
+          </p:cNvPr>
+          <p:cNvPicPr>
+            <a:picLocks noChangeAspect="1"/>
+          </p:cNvPicPr>
+          <p:nvPr/>
+        </p:nvPicPr>
+        <p:blipFill>
+          <a:blip r:embed="rId5">
+            <a:extLst>
+              <a:ext uri="{28A0092B-C50C-407E-A947-70E740481C1C}">
+                <a14:useLocalDpi xmlns:a14="http://schemas.microsoft.com/office/drawing/2010/main" val="0"/>
+              </a:ext>
+            </a:extLst>
+          </a:blip>
+          <a:stretch>
+            <a:fillRect/>
+          </a:stretch>
+        </p:blipFill>
+        <p:spPr>
+          <a:xfrm>
+            <a:off x="8153327" y="2563266"/>
+            <a:ext cx="3009254" cy="3009254"/>
+          </a:xfrm>
+          <a:prstGeom prst="rect">
+            <a:avLst/>
+          </a:prstGeom>
+        </p:spPr>
+      </p:pic>
+    </p:spTree>
+    <p:extLst>
+      <p:ext uri="{BB962C8B-B14F-4D97-AF65-F5344CB8AC3E}">
+        <p14:creationId xmlns:p14="http://schemas.microsoft.com/office/powerpoint/2010/main" val="3739702861"/>
+      </p:ext>
+    </p:extLst>
+  </p:cSld>
+  <p:clrMapOvr>
+    <a:masterClrMapping/>
+  </p:clrMapOvr>
+</p:sld>
+</file>
+
+<file path=ppt/slides/slide7.xml><?xml version="1.0" encoding="utf-8"?>
+<p:sld xmlns:a="http://schemas.openxmlformats.org/drawingml/2006/main" xmlns:r="http://schemas.openxmlformats.org/officeDocument/2006/relationships" xmlns:p="http://schemas.openxmlformats.org/presentationml/2006/main">
+  <p:cSld>
+    <p:bg>
+      <p:bgPr>
+        <a:blipFill dpi="0" rotWithShape="1">
+          <a:blip r:embed="rId2">
+            <a:lum/>
+          </a:blip>
+          <a:srcRect/>
+          <a:stretch>
+            <a:fillRect/>
+          </a:stretch>
+        </a:blipFill>
+        <a:effectLst/>
+      </p:bgPr>
+    </p:bg>
+    <p:spTree>
+      <p:nvGrpSpPr>
+        <p:cNvPr id="1" name="">
+          <a:extLst>
+            <a:ext uri="{FF2B5EF4-FFF2-40B4-BE49-F238E27FC236}">
+              <a16:creationId xmlns:a16="http://schemas.microsoft.com/office/drawing/2014/main" id="{253056AC-5A32-B7D0-707E-7B6C12107219}"/>
+            </a:ext>
+          </a:extLst>
+        </p:cNvPr>
+        <p:cNvGrpSpPr/>
+        <p:nvPr/>
+      </p:nvGrpSpPr>
+      <p:grpSpPr>
+        <a:xfrm>
+          <a:off x="0" y="0"/>
+          <a:ext cx="0" cy="0"/>
+          <a:chOff x="0" y="0"/>
+          <a:chExt cx="0" cy="0"/>
+        </a:xfrm>
+      </p:grpSpPr>
+      <p:sp>
+        <p:nvSpPr>
+          <p:cNvPr id="2" name="Title 1">
+            <a:extLst>
+              <a:ext uri="{FF2B5EF4-FFF2-40B4-BE49-F238E27FC236}">
+                <a16:creationId xmlns:a16="http://schemas.microsoft.com/office/drawing/2014/main" id="{70733C7C-8D2B-6211-5AAE-EDF746C74A28}"/>
+              </a:ext>
+            </a:extLst>
+          </p:cNvPr>
+          <p:cNvSpPr>
+            <a:spLocks noGrp="1"/>
+          </p:cNvSpPr>
+          <p:nvPr>
+            <p:ph type="ctrTitle"/>
+          </p:nvPr>
+        </p:nvSpPr>
+        <p:spPr>
+          <a:xfrm>
+            <a:off x="1524000" y="1122363"/>
+            <a:ext cx="9144000" cy="477837"/>
+          </a:xfrm>
+        </p:spPr>
+        <p:txBody>
+          <a:bodyPr>
+            <a:noAutofit/>
+          </a:bodyPr>
+          <a:lstStyle/>
+          <a:p>
+            <a:r>
+              <a:rPr lang="en-US" sz="3200" dirty="0">
+                <a:solidFill>
+                  <a:srgbClr val="FFE81E"/>
+                </a:solidFill>
+                <a:latin typeface="StarJedi Special Edition" panose="040B0000000000000000" pitchFamily="82" charset="0"/>
+              </a:rPr>
+              <a:t>Scenes</a:t>
+            </a:r>
+          </a:p>
+        </p:txBody>
+      </p:sp>
+      <p:sp>
+        <p:nvSpPr>
+          <p:cNvPr id="3" name="Subtitle 2">
+            <a:extLst>
+              <a:ext uri="{FF2B5EF4-FFF2-40B4-BE49-F238E27FC236}">
+                <a16:creationId xmlns:a16="http://schemas.microsoft.com/office/drawing/2014/main" id="{6B9E0A35-042D-A25A-CCE6-2CD071E1626E}"/>
+              </a:ext>
+            </a:extLst>
+          </p:cNvPr>
+          <p:cNvSpPr>
+            <a:spLocks noGrp="1"/>
+          </p:cNvSpPr>
+          <p:nvPr>
+            <p:ph type="subTitle" idx="1"/>
+          </p:nvPr>
+        </p:nvSpPr>
+        <p:spPr>
+          <a:xfrm>
+            <a:off x="1524000" y="1662023"/>
+            <a:ext cx="9144000" cy="1570007"/>
+          </a:xfrm>
+        </p:spPr>
+        <p:txBody>
+          <a:bodyPr>
+            <a:noAutofit/>
+          </a:bodyPr>
+          <a:lstStyle/>
+          <a:p>
+            <a:pPr marL="285750" indent="-285750" algn="l">
+              <a:buFont typeface="Arial" panose="020B0604020202020204" pitchFamily="34" charset="0"/>
+              <a:buChar char="•"/>
+            </a:pPr>
+            <a:r>
+              <a:rPr lang="en-US" sz="1600" dirty="0">
+                <a:solidFill>
+                  <a:srgbClr val="FFE81E"/>
+                </a:solidFill>
+                <a:latin typeface="StarJedi Special Edition" panose="040B0000000000000000" pitchFamily="82" charset="0"/>
+              </a:rPr>
+              <a:t>Main: the central menu of the game</a:t>
+            </a:r>
+          </a:p>
+          <a:p>
+            <a:pPr marL="285750" indent="-285750" algn="l">
+              <a:buFont typeface="Arial" panose="020B0604020202020204" pitchFamily="34" charset="0"/>
+              <a:buChar char="•"/>
+            </a:pPr>
+            <a:r>
+              <a:rPr lang="en-US" sz="1600" dirty="0">
+                <a:solidFill>
+                  <a:srgbClr val="FFE81E"/>
+                </a:solidFill>
+                <a:latin typeface="StarJedi Special Edition" panose="040B0000000000000000" pitchFamily="82" charset="0"/>
+              </a:rPr>
+              <a:t>Levels: the levels of the game</a:t>
+            </a:r>
+          </a:p>
+          <a:p>
+            <a:pPr marL="285750" indent="-285750" algn="l">
+              <a:buFont typeface="Arial" panose="020B0604020202020204" pitchFamily="34" charset="0"/>
+              <a:buChar char="•"/>
+            </a:pPr>
+            <a:r>
+              <a:rPr lang="en-US" sz="1600" dirty="0">
+                <a:solidFill>
+                  <a:srgbClr val="FFE81E"/>
+                </a:solidFill>
+                <a:latin typeface="StarJedi Special Edition" panose="040B0000000000000000" pitchFamily="82" charset="0"/>
+              </a:rPr>
+              <a:t>Score: the best completion time per level</a:t>
+            </a:r>
+          </a:p>
+          <a:p>
+            <a:pPr marL="285750" indent="-285750" algn="l">
+              <a:buFont typeface="Arial" panose="020B0604020202020204" pitchFamily="34" charset="0"/>
+              <a:buChar char="•"/>
+            </a:pPr>
+            <a:r>
+              <a:rPr lang="en-US" sz="1600" dirty="0">
+                <a:solidFill>
+                  <a:srgbClr val="FFE81E"/>
+                </a:solidFill>
+                <a:latin typeface="StarJedi Special Edition" panose="040B0000000000000000" pitchFamily="82" charset="0"/>
+              </a:rPr>
+              <a:t>Guide: the instructions of the game</a:t>
+            </a:r>
+          </a:p>
+        </p:txBody>
+      </p:sp>
+    </p:spTree>
+    <p:extLst>
+      <p:ext uri="{BB962C8B-B14F-4D97-AF65-F5344CB8AC3E}">
+        <p14:creationId xmlns:p14="http://schemas.microsoft.com/office/powerpoint/2010/main" val="3923346698"/>
+      </p:ext>
+    </p:extLst>
+  </p:cSld>
+  <p:clrMapOvr>
+    <a:masterClrMapping/>
+  </p:clrMapOvr>
+</p:sld>
+</file>
+
+<file path=ppt/slides/slide8.xml><?xml version="1.0" encoding="utf-8"?>
+<p:sld xmlns:a="http://schemas.openxmlformats.org/drawingml/2006/main" xmlns:r="http://schemas.openxmlformats.org/officeDocument/2006/relationships" xmlns:p="http://schemas.openxmlformats.org/presentationml/2006/main">
+  <p:cSld>
+    <p:bg>
+      <p:bgPr>
+        <a:blipFill dpi="0" rotWithShape="1">
+          <a:blip r:embed="rId2">
+            <a:lum/>
+          </a:blip>
+          <a:srcRect/>
+          <a:stretch>
+            <a:fillRect/>
+          </a:stretch>
+        </a:blipFill>
+        <a:effectLst/>
+      </p:bgPr>
+    </p:bg>
+    <p:spTree>
+      <p:nvGrpSpPr>
+        <p:cNvPr id="1" name="">
+          <a:extLst>
+            <a:ext uri="{FF2B5EF4-FFF2-40B4-BE49-F238E27FC236}">
+              <a16:creationId xmlns:a16="http://schemas.microsoft.com/office/drawing/2014/main" id="{B39CFBCF-AAA2-08F4-53A9-1E9F369C0775}"/>
+            </a:ext>
+          </a:extLst>
+        </p:cNvPr>
+        <p:cNvGrpSpPr/>
+        <p:nvPr/>
+      </p:nvGrpSpPr>
+      <p:grpSpPr>
+        <a:xfrm>
+          <a:off x="0" y="0"/>
+          <a:ext cx="0" cy="0"/>
+          <a:chOff x="0" y="0"/>
+          <a:chExt cx="0" cy="0"/>
+        </a:xfrm>
+      </p:grpSpPr>
+      <p:sp>
+        <p:nvSpPr>
+          <p:cNvPr id="2" name="Title 1">
+            <a:extLst>
+              <a:ext uri="{FF2B5EF4-FFF2-40B4-BE49-F238E27FC236}">
+                <a16:creationId xmlns:a16="http://schemas.microsoft.com/office/drawing/2014/main" id="{4CE7844D-8909-180A-F9D6-9A922608DDBF}"/>
+              </a:ext>
+            </a:extLst>
+          </p:cNvPr>
+          <p:cNvSpPr>
+            <a:spLocks noGrp="1"/>
+          </p:cNvSpPr>
+          <p:nvPr>
+            <p:ph type="ctrTitle"/>
+          </p:nvPr>
+        </p:nvSpPr>
+        <p:spPr>
+          <a:xfrm>
+            <a:off x="1524000" y="1122363"/>
+            <a:ext cx="9144000" cy="477837"/>
+          </a:xfrm>
+        </p:spPr>
+        <p:txBody>
+          <a:bodyPr>
+            <a:noAutofit/>
+          </a:bodyPr>
+          <a:lstStyle/>
+          <a:p>
+            <a:r>
+              <a:rPr lang="en-US" sz="3200" dirty="0">
+                <a:solidFill>
+                  <a:srgbClr val="FFE81E"/>
+                </a:solidFill>
+                <a:latin typeface="StarJedi Special Edition" panose="040B0000000000000000" pitchFamily="82" charset="0"/>
+              </a:rPr>
+              <a:t>Game features</a:t>
+            </a:r>
+          </a:p>
+        </p:txBody>
+      </p:sp>
+      <p:sp>
+        <p:nvSpPr>
+          <p:cNvPr id="3" name="Subtitle 2">
+            <a:extLst>
+              <a:ext uri="{FF2B5EF4-FFF2-40B4-BE49-F238E27FC236}">
+                <a16:creationId xmlns:a16="http://schemas.microsoft.com/office/drawing/2014/main" id="{04B5BDF7-C132-63EF-A0D5-F5F69FEBE7C0}"/>
+              </a:ext>
+            </a:extLst>
+          </p:cNvPr>
+          <p:cNvSpPr>
+            <a:spLocks noGrp="1"/>
+          </p:cNvSpPr>
+          <p:nvPr>
+            <p:ph type="subTitle" idx="1"/>
+          </p:nvPr>
+        </p:nvSpPr>
+        <p:spPr>
+          <a:xfrm>
+            <a:off x="1524000" y="1662023"/>
+            <a:ext cx="9144000" cy="4330460"/>
+          </a:xfrm>
+        </p:spPr>
+        <p:txBody>
+          <a:bodyPr>
+            <a:noAutofit/>
+          </a:bodyPr>
+          <a:lstStyle/>
+          <a:p>
+            <a:pPr marL="285750" indent="-285750" algn="l">
+              <a:buFont typeface="Arial" panose="020B0604020202020204" pitchFamily="34" charset="0"/>
+              <a:buChar char="•"/>
+            </a:pPr>
+            <a:r>
+              <a:rPr lang="en-US" sz="1600" dirty="0">
+                <a:solidFill>
+                  <a:srgbClr val="FFE81E"/>
+                </a:solidFill>
+                <a:latin typeface="StarJedi Special Edition" panose="040B0000000000000000" pitchFamily="82" charset="0"/>
+              </a:rPr>
+              <a:t>Smooth music transition between scenes with a global audio stream player</a:t>
+            </a:r>
+          </a:p>
+          <a:p>
+            <a:pPr marL="285750" indent="-285750" algn="l">
+              <a:buFont typeface="Arial" panose="020B0604020202020204" pitchFamily="34" charset="0"/>
+              <a:buChar char="•"/>
+            </a:pPr>
+            <a:r>
+              <a:rPr lang="en-US" sz="1600" dirty="0">
+                <a:solidFill>
+                  <a:srgbClr val="FFE81E"/>
+                </a:solidFill>
+                <a:latin typeface="StarJedi Special Edition" panose="040B0000000000000000" pitchFamily="82" charset="0"/>
+              </a:rPr>
+              <a:t>menu video playback for a background motion effect to imitate the hyper speed</a:t>
+            </a:r>
+          </a:p>
+          <a:p>
+            <a:pPr marL="285750" indent="-285750" algn="l">
+              <a:buFont typeface="Arial" panose="020B0604020202020204" pitchFamily="34" charset="0"/>
+              <a:buChar char="•"/>
+            </a:pPr>
+            <a:r>
+              <a:rPr lang="en-US" sz="1600" dirty="0">
+                <a:solidFill>
+                  <a:srgbClr val="FFE81E"/>
+                </a:solidFill>
+                <a:latin typeface="StarJedi Special Edition" panose="040B0000000000000000" pitchFamily="82" charset="0"/>
+              </a:rPr>
+              <a:t>Save and load stats to/from file “</a:t>
+            </a:r>
+            <a:r>
+              <a:rPr lang="en-US" sz="1600" dirty="0" err="1">
+                <a:solidFill>
+                  <a:srgbClr val="FFE81E"/>
+                </a:solidFill>
+                <a:latin typeface="StarJedi Special Edition" panose="040B0000000000000000" pitchFamily="82" charset="0"/>
+              </a:rPr>
+              <a:t>savestats.bin</a:t>
+            </a:r>
+            <a:r>
+              <a:rPr lang="en-US" sz="1600" dirty="0">
+                <a:solidFill>
+                  <a:srgbClr val="FFE81E"/>
+                </a:solidFill>
+                <a:latin typeface="StarJedi Special Edition" panose="040B0000000000000000" pitchFamily="82" charset="0"/>
+              </a:rPr>
+              <a:t>”</a:t>
+            </a:r>
+          </a:p>
+          <a:p>
+            <a:pPr marL="285750" indent="-285750" algn="l">
+              <a:buFont typeface="Arial" panose="020B0604020202020204" pitchFamily="34" charset="0"/>
+              <a:buChar char="•"/>
+            </a:pPr>
+            <a:r>
+              <a:rPr lang="en-US" sz="1600" dirty="0">
+                <a:solidFill>
+                  <a:srgbClr val="FFE81E"/>
+                </a:solidFill>
+                <a:latin typeface="StarJedi Special Edition" panose="040B0000000000000000" pitchFamily="82" charset="0"/>
+              </a:rPr>
+              <a:t>Global signal for enemy shooting in order to be async</a:t>
+            </a:r>
+          </a:p>
+          <a:p>
+            <a:pPr marL="285750" indent="-285750" algn="l">
+              <a:buFont typeface="Arial" panose="020B0604020202020204" pitchFamily="34" charset="0"/>
+              <a:buChar char="•"/>
+            </a:pPr>
+            <a:r>
+              <a:rPr lang="en-US" sz="1600" dirty="0">
+                <a:solidFill>
+                  <a:srgbClr val="FFE81E"/>
+                </a:solidFill>
+                <a:latin typeface="StarJedi Special Edition" panose="040B0000000000000000" pitchFamily="82" charset="0"/>
+              </a:rPr>
+              <a:t>Timer utilities:</a:t>
+            </a:r>
+          </a:p>
+          <a:p>
+            <a:pPr marL="742950" lvl="1" indent="-285750" algn="l">
+              <a:buFont typeface="+mj-lt"/>
+              <a:buAutoNum type="arabicPeriod"/>
+            </a:pPr>
+            <a:r>
+              <a:rPr lang="en-US" sz="1200" dirty="0">
+                <a:solidFill>
+                  <a:srgbClr val="FFE81E"/>
+                </a:solidFill>
+                <a:latin typeface="StarJedi Special Edition" panose="040B0000000000000000" pitchFamily="82" charset="0"/>
+              </a:rPr>
+              <a:t>Player cannot receive damage immediately (damage cooldown)</a:t>
+            </a:r>
+          </a:p>
+          <a:p>
+            <a:pPr marL="742950" lvl="1" indent="-285750" algn="l">
+              <a:buFont typeface="+mj-lt"/>
+              <a:buAutoNum type="arabicPeriod"/>
+            </a:pPr>
+            <a:r>
+              <a:rPr lang="en-US" sz="1200" dirty="0">
+                <a:solidFill>
+                  <a:srgbClr val="FFE81E"/>
+                </a:solidFill>
+                <a:latin typeface="StarJedi Special Edition" panose="040B0000000000000000" pitchFamily="82" charset="0"/>
+              </a:rPr>
+              <a:t>Enemies shoot on cooldown (shot cooldown)</a:t>
+            </a:r>
+          </a:p>
+          <a:p>
+            <a:pPr marL="742950" lvl="1" indent="-285750" algn="l">
+              <a:buFont typeface="+mj-lt"/>
+              <a:buAutoNum type="arabicPeriod"/>
+            </a:pPr>
+            <a:r>
+              <a:rPr lang="en-US" sz="1200" dirty="0">
+                <a:solidFill>
+                  <a:srgbClr val="FFE81E"/>
+                </a:solidFill>
+                <a:latin typeface="StarJedi Special Edition" panose="040B0000000000000000" pitchFamily="82" charset="0"/>
+              </a:rPr>
+              <a:t>Beam disappears after 1 second of being fired</a:t>
+            </a:r>
+          </a:p>
+          <a:p>
+            <a:pPr marL="742950" lvl="1" indent="-285750" algn="l">
+              <a:buFont typeface="+mj-lt"/>
+              <a:buAutoNum type="arabicPeriod"/>
+            </a:pPr>
+            <a:r>
+              <a:rPr lang="en-US" sz="1200" dirty="0">
+                <a:solidFill>
+                  <a:srgbClr val="FFE81E"/>
+                </a:solidFill>
+                <a:latin typeface="StarJedi Special Edition" panose="040B0000000000000000" pitchFamily="82" charset="0"/>
+              </a:rPr>
+              <a:t>Level 2 countdown</a:t>
+            </a:r>
+          </a:p>
+          <a:p>
+            <a:pPr marL="742950" lvl="1" indent="-285750" algn="l">
+              <a:buFont typeface="+mj-lt"/>
+              <a:buAutoNum type="arabicPeriod"/>
+            </a:pPr>
+            <a:endParaRPr lang="en-US" sz="1600" dirty="0">
+              <a:solidFill>
+                <a:srgbClr val="FFE81E"/>
+              </a:solidFill>
+              <a:latin typeface="StarJedi Special Edition" panose="040B0000000000000000" pitchFamily="82" charset="0"/>
+            </a:endParaRPr>
+          </a:p>
+        </p:txBody>
+      </p:sp>
+    </p:spTree>
+    <p:extLst>
+      <p:ext uri="{BB962C8B-B14F-4D97-AF65-F5344CB8AC3E}">
+        <p14:creationId xmlns:p14="http://schemas.microsoft.com/office/powerpoint/2010/main" val="1816965595"/>
+      </p:ext>
+    </p:extLst>
+  </p:cSld>
+  <p:clrMapOvr>
+    <a:masterClrMapping/>
+  </p:clrMapOvr>
+</p:sld>
+</file>
+
+<file path=ppt/slides/slide9.xml><?xml version="1.0" encoding="utf-8"?>
 <p:sld xmlns:a="http://schemas.openxmlformats.org/drawingml/2006/main" xmlns:r="http://schemas.openxmlformats.org/officeDocument/2006/relationships" xmlns:p="http://schemas.openxmlformats.org/presentationml/2006/main">
   <p:cSld>
     <p:bg>
@@ -4299,1156 +5557,6 @@
     <p:extLst>
       <p:ext uri="{BB962C8B-B14F-4D97-AF65-F5344CB8AC3E}">
         <p14:creationId xmlns:p14="http://schemas.microsoft.com/office/powerpoint/2010/main" val="1419967745"/>
-      </p:ext>
-    </p:extLst>
-  </p:cSld>
-  <p:clrMapOvr>
-    <a:masterClrMapping/>
-  </p:clrMapOvr>
-</p:sld>
-</file>
-
-<file path=ppt/slides/slide5.xml><?xml version="1.0" encoding="utf-8"?>
-<p:sld xmlns:a="http://schemas.openxmlformats.org/drawingml/2006/main" xmlns:r="http://schemas.openxmlformats.org/officeDocument/2006/relationships" xmlns:p="http://schemas.openxmlformats.org/presentationml/2006/main">
-  <p:cSld>
-    <p:bg>
-      <p:bgPr>
-        <a:blipFill dpi="0" rotWithShape="1">
-          <a:blip r:embed="rId2">
-            <a:lum/>
-          </a:blip>
-          <a:srcRect/>
-          <a:stretch>
-            <a:fillRect/>
-          </a:stretch>
-        </a:blipFill>
-        <a:effectLst/>
-      </p:bgPr>
-    </p:bg>
-    <p:spTree>
-      <p:nvGrpSpPr>
-        <p:cNvPr id="1" name="">
-          <a:extLst>
-            <a:ext uri="{FF2B5EF4-FFF2-40B4-BE49-F238E27FC236}">
-              <a16:creationId xmlns:a16="http://schemas.microsoft.com/office/drawing/2014/main" id="{64801EC1-926D-6B87-7D50-E5BB0D18EDB9}"/>
-            </a:ext>
-          </a:extLst>
-        </p:cNvPr>
-        <p:cNvGrpSpPr/>
-        <p:nvPr/>
-      </p:nvGrpSpPr>
-      <p:grpSpPr>
-        <a:xfrm>
-          <a:off x="0" y="0"/>
-          <a:ext cx="0" cy="0"/>
-          <a:chOff x="0" y="0"/>
-          <a:chExt cx="0" cy="0"/>
-        </a:xfrm>
-      </p:grpSpPr>
-      <p:sp>
-        <p:nvSpPr>
-          <p:cNvPr id="2" name="Title 1">
-            <a:extLst>
-              <a:ext uri="{FF2B5EF4-FFF2-40B4-BE49-F238E27FC236}">
-                <a16:creationId xmlns:a16="http://schemas.microsoft.com/office/drawing/2014/main" id="{F129860C-8D0A-E12D-5D15-26A73529703C}"/>
-              </a:ext>
-            </a:extLst>
-          </p:cNvPr>
-          <p:cNvSpPr>
-            <a:spLocks noGrp="1"/>
-          </p:cNvSpPr>
-          <p:nvPr>
-            <p:ph type="ctrTitle"/>
-          </p:nvPr>
-        </p:nvSpPr>
-        <p:spPr>
-          <a:xfrm>
-            <a:off x="1524000" y="1122363"/>
-            <a:ext cx="9144000" cy="477837"/>
-          </a:xfrm>
-        </p:spPr>
-        <p:txBody>
-          <a:bodyPr>
-            <a:noAutofit/>
-          </a:bodyPr>
-          <a:lstStyle/>
-          <a:p>
-            <a:r>
-              <a:rPr lang="en-US" sz="3200" dirty="0">
-                <a:solidFill>
-                  <a:srgbClr val="FFE81E"/>
-                </a:solidFill>
-                <a:latin typeface="StarJedi Special Edition" panose="040B0000000000000000" pitchFamily="82" charset="0"/>
-              </a:rPr>
-              <a:t>player</a:t>
-            </a:r>
-          </a:p>
-        </p:txBody>
-      </p:sp>
-      <p:sp>
-        <p:nvSpPr>
-          <p:cNvPr id="3" name="Subtitle 2">
-            <a:extLst>
-              <a:ext uri="{FF2B5EF4-FFF2-40B4-BE49-F238E27FC236}">
-                <a16:creationId xmlns:a16="http://schemas.microsoft.com/office/drawing/2014/main" id="{444E297B-718F-F0DA-D4AF-46E7796FC36D}"/>
-              </a:ext>
-            </a:extLst>
-          </p:cNvPr>
-          <p:cNvSpPr>
-            <a:spLocks noGrp="1"/>
-          </p:cNvSpPr>
-          <p:nvPr>
-            <p:ph type="subTitle" idx="1"/>
-          </p:nvPr>
-        </p:nvSpPr>
-        <p:spPr>
-          <a:xfrm>
-            <a:off x="1524000" y="1662023"/>
-            <a:ext cx="9144000" cy="1570007"/>
-          </a:xfrm>
-        </p:spPr>
-        <p:txBody>
-          <a:bodyPr>
-            <a:noAutofit/>
-          </a:bodyPr>
-          <a:lstStyle/>
-          <a:p>
-            <a:pPr marL="285750" indent="-285750" algn="l">
-              <a:buFont typeface="Arial" panose="020B0604020202020204" pitchFamily="34" charset="0"/>
-              <a:buChar char="•"/>
-            </a:pPr>
-            <a:r>
-              <a:rPr lang="en-US" sz="1600" dirty="0">
-                <a:solidFill>
-                  <a:srgbClr val="FFE81E"/>
-                </a:solidFill>
-                <a:latin typeface="StarJedi Special Edition" panose="040B0000000000000000" pitchFamily="82" charset="0"/>
-              </a:rPr>
-              <a:t>Moves both with the keyboard arrows and the w-a-s-d combination</a:t>
-            </a:r>
-          </a:p>
-          <a:p>
-            <a:pPr marL="285750" indent="-285750" algn="l">
-              <a:buFont typeface="Arial" panose="020B0604020202020204" pitchFamily="34" charset="0"/>
-              <a:buChar char="•"/>
-            </a:pPr>
-            <a:r>
-              <a:rPr lang="en-US" sz="1600" dirty="0">
-                <a:solidFill>
-                  <a:srgbClr val="FFE81E"/>
-                </a:solidFill>
-                <a:latin typeface="StarJedi Special Edition" panose="040B0000000000000000" pitchFamily="82" charset="0"/>
-              </a:rPr>
-              <a:t>jumps with the spacebar</a:t>
-            </a:r>
-          </a:p>
-          <a:p>
-            <a:pPr marL="285750" indent="-285750" algn="l">
-              <a:buFont typeface="Arial" panose="020B0604020202020204" pitchFamily="34" charset="0"/>
-              <a:buChar char="•"/>
-            </a:pPr>
-            <a:r>
-              <a:rPr lang="en-US" sz="1600" dirty="0">
-                <a:solidFill>
-                  <a:srgbClr val="FFE81E"/>
-                </a:solidFill>
-                <a:latin typeface="StarJedi Special Edition" panose="040B0000000000000000" pitchFamily="82" charset="0"/>
-              </a:rPr>
-              <a:t>Performs attack action with the “h” physical key</a:t>
-            </a:r>
-          </a:p>
-          <a:p>
-            <a:pPr marL="285750" indent="-285750" algn="l">
-              <a:buFont typeface="Arial" panose="020B0604020202020204" pitchFamily="34" charset="0"/>
-              <a:buChar char="•"/>
-            </a:pPr>
-            <a:r>
-              <a:rPr lang="en-US" sz="1600" dirty="0">
-                <a:solidFill>
-                  <a:srgbClr val="FFE81E"/>
-                </a:solidFill>
-                <a:latin typeface="StarJedi Special Edition" panose="040B0000000000000000" pitchFamily="82" charset="0"/>
-              </a:rPr>
-              <a:t>Defends enemy fire with the “p” physical key</a:t>
-            </a:r>
-          </a:p>
-        </p:txBody>
-      </p:sp>
-      <p:pic>
-        <p:nvPicPr>
-          <p:cNvPr id="7" name="Picture 6" descr="A person holding a light sword&#10;&#10;Description automatically generated">
-            <a:extLst>
-              <a:ext uri="{FF2B5EF4-FFF2-40B4-BE49-F238E27FC236}">
-                <a16:creationId xmlns:a16="http://schemas.microsoft.com/office/drawing/2014/main" id="{BD70554F-01ED-5DDE-FF98-148BE283B442}"/>
-              </a:ext>
-            </a:extLst>
-          </p:cNvPr>
-          <p:cNvPicPr>
-            <a:picLocks noChangeAspect="1"/>
-          </p:cNvPicPr>
-          <p:nvPr/>
-        </p:nvPicPr>
-        <p:blipFill>
-          <a:blip r:embed="rId3">
-            <a:extLst>
-              <a:ext uri="{28A0092B-C50C-407E-A947-70E740481C1C}">
-                <a14:useLocalDpi xmlns:a14="http://schemas.microsoft.com/office/drawing/2010/main" val="0"/>
-              </a:ext>
-            </a:extLst>
-          </a:blip>
-          <a:stretch>
-            <a:fillRect/>
-          </a:stretch>
-        </p:blipFill>
-        <p:spPr>
-          <a:xfrm>
-            <a:off x="4756114" y="2946657"/>
-            <a:ext cx="2679772" cy="2994067"/>
-          </a:xfrm>
-          <a:prstGeom prst="rect">
-            <a:avLst/>
-          </a:prstGeom>
-        </p:spPr>
-      </p:pic>
-    </p:spTree>
-    <p:extLst>
-      <p:ext uri="{BB962C8B-B14F-4D97-AF65-F5344CB8AC3E}">
-        <p14:creationId xmlns:p14="http://schemas.microsoft.com/office/powerpoint/2010/main" val="2629288263"/>
-      </p:ext>
-    </p:extLst>
-  </p:cSld>
-  <p:clrMapOvr>
-    <a:masterClrMapping/>
-  </p:clrMapOvr>
-</p:sld>
-</file>
-
-<file path=ppt/slides/slide6.xml><?xml version="1.0" encoding="utf-8"?>
-<p:sld xmlns:a="http://schemas.openxmlformats.org/drawingml/2006/main" xmlns:r="http://schemas.openxmlformats.org/officeDocument/2006/relationships" xmlns:p="http://schemas.openxmlformats.org/presentationml/2006/main">
-  <p:cSld>
-    <p:bg>
-      <p:bgPr>
-        <a:blipFill dpi="0" rotWithShape="1">
-          <a:blip r:embed="rId2">
-            <a:lum/>
-          </a:blip>
-          <a:srcRect/>
-          <a:stretch>
-            <a:fillRect/>
-          </a:stretch>
-        </a:blipFill>
-        <a:effectLst/>
-      </p:bgPr>
-    </p:bg>
-    <p:spTree>
-      <p:nvGrpSpPr>
-        <p:cNvPr id="1" name="">
-          <a:extLst>
-            <a:ext uri="{FF2B5EF4-FFF2-40B4-BE49-F238E27FC236}">
-              <a16:creationId xmlns:a16="http://schemas.microsoft.com/office/drawing/2014/main" id="{DC3ADE69-1B1D-F35A-297A-54653D57E70F}"/>
-            </a:ext>
-          </a:extLst>
-        </p:cNvPr>
-        <p:cNvGrpSpPr/>
-        <p:nvPr/>
-      </p:nvGrpSpPr>
-      <p:grpSpPr>
-        <a:xfrm>
-          <a:off x="0" y="0"/>
-          <a:ext cx="0" cy="0"/>
-          <a:chOff x="0" y="0"/>
-          <a:chExt cx="0" cy="0"/>
-        </a:xfrm>
-      </p:grpSpPr>
-      <p:sp>
-        <p:nvSpPr>
-          <p:cNvPr id="2" name="Title 1">
-            <a:extLst>
-              <a:ext uri="{FF2B5EF4-FFF2-40B4-BE49-F238E27FC236}">
-                <a16:creationId xmlns:a16="http://schemas.microsoft.com/office/drawing/2014/main" id="{D95F532A-BD46-19A7-316C-966E1FB491AB}"/>
-              </a:ext>
-            </a:extLst>
-          </p:cNvPr>
-          <p:cNvSpPr>
-            <a:spLocks noGrp="1"/>
-          </p:cNvSpPr>
-          <p:nvPr>
-            <p:ph type="ctrTitle"/>
-          </p:nvPr>
-        </p:nvSpPr>
-        <p:spPr>
-          <a:xfrm>
-            <a:off x="1524000" y="1122363"/>
-            <a:ext cx="9144000" cy="477837"/>
-          </a:xfrm>
-        </p:spPr>
-        <p:txBody>
-          <a:bodyPr>
-            <a:noAutofit/>
-          </a:bodyPr>
-          <a:lstStyle/>
-          <a:p>
-            <a:r>
-              <a:rPr lang="en-US" sz="3200" dirty="0">
-                <a:solidFill>
-                  <a:srgbClr val="FFE81E"/>
-                </a:solidFill>
-                <a:latin typeface="StarJedi Special Edition" panose="040B0000000000000000" pitchFamily="82" charset="0"/>
-              </a:rPr>
-              <a:t>enemies</a:t>
-            </a:r>
-          </a:p>
-        </p:txBody>
-      </p:sp>
-      <p:sp>
-        <p:nvSpPr>
-          <p:cNvPr id="3" name="Subtitle 2">
-            <a:extLst>
-              <a:ext uri="{FF2B5EF4-FFF2-40B4-BE49-F238E27FC236}">
-                <a16:creationId xmlns:a16="http://schemas.microsoft.com/office/drawing/2014/main" id="{C0E0E21A-27D4-22FF-1856-85E511754513}"/>
-              </a:ext>
-            </a:extLst>
-          </p:cNvPr>
-          <p:cNvSpPr>
-            <a:spLocks noGrp="1"/>
-          </p:cNvSpPr>
-          <p:nvPr>
-            <p:ph type="subTitle" idx="1"/>
-          </p:nvPr>
-        </p:nvSpPr>
-        <p:spPr>
-          <a:xfrm>
-            <a:off x="1524000" y="1662023"/>
-            <a:ext cx="9144000" cy="1570007"/>
-          </a:xfrm>
-        </p:spPr>
-        <p:txBody>
-          <a:bodyPr>
-            <a:noAutofit/>
-          </a:bodyPr>
-          <a:lstStyle/>
-          <a:p>
-            <a:pPr marL="285750" indent="-285750" algn="l">
-              <a:buFont typeface="Arial" panose="020B0604020202020204" pitchFamily="34" charset="0"/>
-              <a:buChar char="•"/>
-            </a:pPr>
-            <a:r>
-              <a:rPr lang="en-US" sz="1600" dirty="0">
-                <a:solidFill>
-                  <a:srgbClr val="FFE81E"/>
-                </a:solidFill>
-                <a:latin typeface="StarJedi Special Edition" panose="040B0000000000000000" pitchFamily="82" charset="0"/>
-              </a:rPr>
-              <a:t>Chases our player on the x-axis, when he enters the detection area</a:t>
-            </a:r>
-          </a:p>
-          <a:p>
-            <a:pPr marL="285750" indent="-285750" algn="l">
-              <a:buFont typeface="Arial" panose="020B0604020202020204" pitchFamily="34" charset="0"/>
-              <a:buChar char="•"/>
-            </a:pPr>
-            <a:r>
-              <a:rPr lang="en-US" sz="1600" dirty="0">
-                <a:solidFill>
-                  <a:srgbClr val="FFE81E"/>
-                </a:solidFill>
-                <a:latin typeface="StarJedi Special Edition" panose="040B0000000000000000" pitchFamily="82" charset="0"/>
-              </a:rPr>
-              <a:t>Shoots laser blasts every 1.5 seconds</a:t>
-            </a:r>
-          </a:p>
-          <a:p>
-            <a:pPr marL="285750" indent="-285750" algn="l">
-              <a:buFont typeface="Arial" panose="020B0604020202020204" pitchFamily="34" charset="0"/>
-              <a:buChar char="•"/>
-            </a:pPr>
-            <a:r>
-              <a:rPr lang="en-US" sz="1600" dirty="0">
-                <a:solidFill>
-                  <a:srgbClr val="FFE81E"/>
-                </a:solidFill>
-                <a:latin typeface="StarJedi Special Edition" panose="040B0000000000000000" pitchFamily="82" charset="0"/>
-              </a:rPr>
-              <a:t>Captures player (reduces player’s health by entering his detection area)</a:t>
-            </a:r>
-          </a:p>
-        </p:txBody>
-      </p:sp>
-      <p:pic>
-        <p:nvPicPr>
-          <p:cNvPr id="5" name="Picture 4" descr="A video game character holding an object&#10;&#10;Description automatically generated">
-            <a:extLst>
-              <a:ext uri="{FF2B5EF4-FFF2-40B4-BE49-F238E27FC236}">
-                <a16:creationId xmlns:a16="http://schemas.microsoft.com/office/drawing/2014/main" id="{38DBB877-F718-CAE8-F6DC-5EF6FE43E9D3}"/>
-              </a:ext>
-            </a:extLst>
-          </p:cNvPr>
-          <p:cNvPicPr>
-            <a:picLocks noChangeAspect="1"/>
-          </p:cNvPicPr>
-          <p:nvPr/>
-        </p:nvPicPr>
-        <p:blipFill>
-          <a:blip r:embed="rId3">
-            <a:extLst>
-              <a:ext uri="{28A0092B-C50C-407E-A947-70E740481C1C}">
-                <a14:useLocalDpi xmlns:a14="http://schemas.microsoft.com/office/drawing/2010/main" val="0"/>
-              </a:ext>
-            </a:extLst>
-          </a:blip>
-          <a:stretch>
-            <a:fillRect/>
-          </a:stretch>
-        </p:blipFill>
-        <p:spPr>
-          <a:xfrm>
-            <a:off x="5238322" y="3295179"/>
-            <a:ext cx="1715355" cy="1900798"/>
-          </a:xfrm>
-          <a:prstGeom prst="rect">
-            <a:avLst/>
-          </a:prstGeom>
-        </p:spPr>
-      </p:pic>
-    </p:spTree>
-    <p:extLst>
-      <p:ext uri="{BB962C8B-B14F-4D97-AF65-F5344CB8AC3E}">
-        <p14:creationId xmlns:p14="http://schemas.microsoft.com/office/powerpoint/2010/main" val="3838757829"/>
-      </p:ext>
-    </p:extLst>
-  </p:cSld>
-  <p:clrMapOvr>
-    <a:masterClrMapping/>
-  </p:clrMapOvr>
-</p:sld>
-</file>
-
-<file path=ppt/slides/slide7.xml><?xml version="1.0" encoding="utf-8"?>
-<p:sld xmlns:a="http://schemas.openxmlformats.org/drawingml/2006/main" xmlns:r="http://schemas.openxmlformats.org/officeDocument/2006/relationships" xmlns:p="http://schemas.openxmlformats.org/presentationml/2006/main">
-  <p:cSld>
-    <p:bg>
-      <p:bgPr>
-        <a:blipFill dpi="0" rotWithShape="1">
-          <a:blip r:embed="rId2">
-            <a:lum/>
-          </a:blip>
-          <a:srcRect/>
-          <a:stretch>
-            <a:fillRect/>
-          </a:stretch>
-        </a:blipFill>
-        <a:effectLst/>
-      </p:bgPr>
-    </p:bg>
-    <p:spTree>
-      <p:nvGrpSpPr>
-        <p:cNvPr id="1" name="">
-          <a:extLst>
-            <a:ext uri="{FF2B5EF4-FFF2-40B4-BE49-F238E27FC236}">
-              <a16:creationId xmlns:a16="http://schemas.microsoft.com/office/drawing/2014/main" id="{8644568B-24D3-4850-CF6A-B1144CCBBD23}"/>
-            </a:ext>
-          </a:extLst>
-        </p:cNvPr>
-        <p:cNvGrpSpPr/>
-        <p:nvPr/>
-      </p:nvGrpSpPr>
-      <p:grpSpPr>
-        <a:xfrm>
-          <a:off x="0" y="0"/>
-          <a:ext cx="0" cy="0"/>
-          <a:chOff x="0" y="0"/>
-          <a:chExt cx="0" cy="0"/>
-        </a:xfrm>
-      </p:grpSpPr>
-      <p:sp>
-        <p:nvSpPr>
-          <p:cNvPr id="2" name="Title 1">
-            <a:extLst>
-              <a:ext uri="{FF2B5EF4-FFF2-40B4-BE49-F238E27FC236}">
-                <a16:creationId xmlns:a16="http://schemas.microsoft.com/office/drawing/2014/main" id="{F2575D94-5C93-D011-5445-6436FBE70C8B}"/>
-              </a:ext>
-            </a:extLst>
-          </p:cNvPr>
-          <p:cNvSpPr>
-            <a:spLocks noGrp="1"/>
-          </p:cNvSpPr>
-          <p:nvPr>
-            <p:ph type="ctrTitle"/>
-          </p:nvPr>
-        </p:nvSpPr>
-        <p:spPr>
-          <a:xfrm>
-            <a:off x="1524000" y="1122363"/>
-            <a:ext cx="9144000" cy="477837"/>
-          </a:xfrm>
-        </p:spPr>
-        <p:txBody>
-          <a:bodyPr>
-            <a:noAutofit/>
-          </a:bodyPr>
-          <a:lstStyle/>
-          <a:p>
-            <a:r>
-              <a:rPr lang="en-US" sz="3200" dirty="0">
-                <a:solidFill>
-                  <a:srgbClr val="FFE81E"/>
-                </a:solidFill>
-                <a:latin typeface="StarJedi Special Edition" panose="040B0000000000000000" pitchFamily="82" charset="0"/>
-              </a:rPr>
-              <a:t>objects</a:t>
-            </a:r>
-          </a:p>
-        </p:txBody>
-      </p:sp>
-      <p:sp>
-        <p:nvSpPr>
-          <p:cNvPr id="3" name="Subtitle 2">
-            <a:extLst>
-              <a:ext uri="{FF2B5EF4-FFF2-40B4-BE49-F238E27FC236}">
-                <a16:creationId xmlns:a16="http://schemas.microsoft.com/office/drawing/2014/main" id="{5B379621-8FF0-5574-8FAF-2B2FA4310C93}"/>
-              </a:ext>
-            </a:extLst>
-          </p:cNvPr>
-          <p:cNvSpPr>
-            <a:spLocks noGrp="1"/>
-          </p:cNvSpPr>
-          <p:nvPr>
-            <p:ph type="subTitle" idx="1"/>
-          </p:nvPr>
-        </p:nvSpPr>
-        <p:spPr>
-          <a:xfrm>
-            <a:off x="1524000" y="1662023"/>
-            <a:ext cx="9144000" cy="1570007"/>
-          </a:xfrm>
-        </p:spPr>
-        <p:txBody>
-          <a:bodyPr>
-            <a:noAutofit/>
-          </a:bodyPr>
-          <a:lstStyle/>
-          <a:p>
-            <a:pPr marL="285750" indent="-285750" algn="l">
-              <a:buFont typeface="Arial" panose="020B0604020202020204" pitchFamily="34" charset="0"/>
-              <a:buChar char="•"/>
-            </a:pPr>
-            <a:r>
-              <a:rPr lang="en-US" sz="1600" dirty="0">
-                <a:solidFill>
-                  <a:srgbClr val="FFE81E"/>
-                </a:solidFill>
-                <a:latin typeface="StarJedi Special Edition" panose="040B0000000000000000" pitchFamily="82" charset="0"/>
-              </a:rPr>
-              <a:t>Laser beam: THE product of enemy’s offensive blast</a:t>
-            </a:r>
-          </a:p>
-          <a:p>
-            <a:pPr marL="285750" indent="-285750" algn="l">
-              <a:buFont typeface="Arial" panose="020B0604020202020204" pitchFamily="34" charset="0"/>
-              <a:buChar char="•"/>
-            </a:pPr>
-            <a:r>
-              <a:rPr lang="en-US" sz="1600" dirty="0">
-                <a:solidFill>
-                  <a:srgbClr val="FFE81E"/>
-                </a:solidFill>
-                <a:latin typeface="StarJedi Special Edition" panose="040B0000000000000000" pitchFamily="82" charset="0"/>
-              </a:rPr>
-              <a:t>Spacecraft: the getaway vehicle</a:t>
-            </a:r>
-          </a:p>
-          <a:p>
-            <a:pPr marL="285750" indent="-285750" algn="l">
-              <a:buFont typeface="Arial" panose="020B0604020202020204" pitchFamily="34" charset="0"/>
-              <a:buChar char="•"/>
-            </a:pPr>
-            <a:r>
-              <a:rPr lang="en-US" sz="1600" dirty="0">
-                <a:solidFill>
-                  <a:srgbClr val="FFE81E"/>
-                </a:solidFill>
-                <a:latin typeface="StarJedi Special Edition" panose="040B0000000000000000" pitchFamily="82" charset="0"/>
-              </a:rPr>
-              <a:t>Collectables: the main objective</a:t>
-            </a:r>
-          </a:p>
-        </p:txBody>
-      </p:sp>
-      <p:pic>
-        <p:nvPicPr>
-          <p:cNvPr id="6" name="Picture 5" descr="A red light in the dark&#10;&#10;Description automatically generated">
-            <a:extLst>
-              <a:ext uri="{FF2B5EF4-FFF2-40B4-BE49-F238E27FC236}">
-                <a16:creationId xmlns:a16="http://schemas.microsoft.com/office/drawing/2014/main" id="{0CABE5EE-9E0C-3EAF-4A6E-0DAE6601FEBD}"/>
-              </a:ext>
-            </a:extLst>
-          </p:cNvPr>
-          <p:cNvPicPr>
-            <a:picLocks noChangeAspect="1"/>
-          </p:cNvPicPr>
-          <p:nvPr/>
-        </p:nvPicPr>
-        <p:blipFill>
-          <a:blip r:embed="rId3">
-            <a:extLst>
-              <a:ext uri="{28A0092B-C50C-407E-A947-70E740481C1C}">
-                <a14:useLocalDpi xmlns:a14="http://schemas.microsoft.com/office/drawing/2010/main" val="0"/>
-              </a:ext>
-            </a:extLst>
-          </a:blip>
-          <a:stretch>
-            <a:fillRect/>
-          </a:stretch>
-        </p:blipFill>
-        <p:spPr>
-          <a:xfrm>
-            <a:off x="2299388" y="3429000"/>
-            <a:ext cx="1209675" cy="1171575"/>
-          </a:xfrm>
-          <a:prstGeom prst="rect">
-            <a:avLst/>
-          </a:prstGeom>
-        </p:spPr>
-      </p:pic>
-      <p:pic>
-        <p:nvPicPr>
-          <p:cNvPr id="8" name="Picture 7">
-            <a:extLst>
-              <a:ext uri="{FF2B5EF4-FFF2-40B4-BE49-F238E27FC236}">
-                <a16:creationId xmlns:a16="http://schemas.microsoft.com/office/drawing/2014/main" id="{72B6DAB2-D222-8CC7-9DDB-126A5BE685B4}"/>
-              </a:ext>
-            </a:extLst>
-          </p:cNvPr>
-          <p:cNvPicPr>
-            <a:picLocks noChangeAspect="1"/>
-          </p:cNvPicPr>
-          <p:nvPr/>
-        </p:nvPicPr>
-        <p:blipFill>
-          <a:blip r:embed="rId4">
-            <a:extLst>
-              <a:ext uri="{28A0092B-C50C-407E-A947-70E740481C1C}">
-                <a14:useLocalDpi xmlns:a14="http://schemas.microsoft.com/office/drawing/2010/main" val="0"/>
-              </a:ext>
-            </a:extLst>
-          </a:blip>
-          <a:stretch>
-            <a:fillRect/>
-          </a:stretch>
-        </p:blipFill>
-        <p:spPr>
-          <a:xfrm>
-            <a:off x="4893560" y="3625971"/>
-            <a:ext cx="2404880" cy="883845"/>
-          </a:xfrm>
-          <a:prstGeom prst="rect">
-            <a:avLst/>
-          </a:prstGeom>
-        </p:spPr>
-      </p:pic>
-      <p:pic>
-        <p:nvPicPr>
-          <p:cNvPr id="10" name="Picture 9" descr="A black and yellow space ship&#10;&#10;Description automatically generated">
-            <a:extLst>
-              <a:ext uri="{FF2B5EF4-FFF2-40B4-BE49-F238E27FC236}">
-                <a16:creationId xmlns:a16="http://schemas.microsoft.com/office/drawing/2014/main" id="{9DD762E0-1B66-B6DE-2818-D2B632A0ADC5}"/>
-              </a:ext>
-            </a:extLst>
-          </p:cNvPr>
-          <p:cNvPicPr>
-            <a:picLocks noChangeAspect="1"/>
-          </p:cNvPicPr>
-          <p:nvPr/>
-        </p:nvPicPr>
-        <p:blipFill>
-          <a:blip r:embed="rId5">
-            <a:extLst>
-              <a:ext uri="{28A0092B-C50C-407E-A947-70E740481C1C}">
-                <a14:useLocalDpi xmlns:a14="http://schemas.microsoft.com/office/drawing/2010/main" val="0"/>
-              </a:ext>
-            </a:extLst>
-          </a:blip>
-          <a:stretch>
-            <a:fillRect/>
-          </a:stretch>
-        </p:blipFill>
-        <p:spPr>
-          <a:xfrm>
-            <a:off x="8153327" y="2563266"/>
-            <a:ext cx="3009254" cy="3009254"/>
-          </a:xfrm>
-          <a:prstGeom prst="rect">
-            <a:avLst/>
-          </a:prstGeom>
-        </p:spPr>
-      </p:pic>
-    </p:spTree>
-    <p:extLst>
-      <p:ext uri="{BB962C8B-B14F-4D97-AF65-F5344CB8AC3E}">
-        <p14:creationId xmlns:p14="http://schemas.microsoft.com/office/powerpoint/2010/main" val="3739702861"/>
-      </p:ext>
-    </p:extLst>
-  </p:cSld>
-  <p:clrMapOvr>
-    <a:masterClrMapping/>
-  </p:clrMapOvr>
-</p:sld>
-</file>
-
-<file path=ppt/slides/slide8.xml><?xml version="1.0" encoding="utf-8"?>
-<p:sld xmlns:a="http://schemas.openxmlformats.org/drawingml/2006/main" xmlns:r="http://schemas.openxmlformats.org/officeDocument/2006/relationships" xmlns:p="http://schemas.openxmlformats.org/presentationml/2006/main">
-  <p:cSld>
-    <p:bg>
-      <p:bgPr>
-        <a:blipFill dpi="0" rotWithShape="1">
-          <a:blip r:embed="rId2">
-            <a:lum/>
-          </a:blip>
-          <a:srcRect/>
-          <a:stretch>
-            <a:fillRect/>
-          </a:stretch>
-        </a:blipFill>
-        <a:effectLst/>
-      </p:bgPr>
-    </p:bg>
-    <p:spTree>
-      <p:nvGrpSpPr>
-        <p:cNvPr id="1" name="">
-          <a:extLst>
-            <a:ext uri="{FF2B5EF4-FFF2-40B4-BE49-F238E27FC236}">
-              <a16:creationId xmlns:a16="http://schemas.microsoft.com/office/drawing/2014/main" id="{253056AC-5A32-B7D0-707E-7B6C12107219}"/>
-            </a:ext>
-          </a:extLst>
-        </p:cNvPr>
-        <p:cNvGrpSpPr/>
-        <p:nvPr/>
-      </p:nvGrpSpPr>
-      <p:grpSpPr>
-        <a:xfrm>
-          <a:off x="0" y="0"/>
-          <a:ext cx="0" cy="0"/>
-          <a:chOff x="0" y="0"/>
-          <a:chExt cx="0" cy="0"/>
-        </a:xfrm>
-      </p:grpSpPr>
-      <p:sp>
-        <p:nvSpPr>
-          <p:cNvPr id="2" name="Title 1">
-            <a:extLst>
-              <a:ext uri="{FF2B5EF4-FFF2-40B4-BE49-F238E27FC236}">
-                <a16:creationId xmlns:a16="http://schemas.microsoft.com/office/drawing/2014/main" id="{70733C7C-8D2B-6211-5AAE-EDF746C74A28}"/>
-              </a:ext>
-            </a:extLst>
-          </p:cNvPr>
-          <p:cNvSpPr>
-            <a:spLocks noGrp="1"/>
-          </p:cNvSpPr>
-          <p:nvPr>
-            <p:ph type="ctrTitle"/>
-          </p:nvPr>
-        </p:nvSpPr>
-        <p:spPr>
-          <a:xfrm>
-            <a:off x="1524000" y="1122363"/>
-            <a:ext cx="9144000" cy="477837"/>
-          </a:xfrm>
-        </p:spPr>
-        <p:txBody>
-          <a:bodyPr>
-            <a:noAutofit/>
-          </a:bodyPr>
-          <a:lstStyle/>
-          <a:p>
-            <a:r>
-              <a:rPr lang="en-US" sz="3200" dirty="0">
-                <a:solidFill>
-                  <a:srgbClr val="FFE81E"/>
-                </a:solidFill>
-                <a:latin typeface="StarJedi Special Edition" panose="040B0000000000000000" pitchFamily="82" charset="0"/>
-              </a:rPr>
-              <a:t>Scenes</a:t>
-            </a:r>
-          </a:p>
-        </p:txBody>
-      </p:sp>
-      <p:sp>
-        <p:nvSpPr>
-          <p:cNvPr id="3" name="Subtitle 2">
-            <a:extLst>
-              <a:ext uri="{FF2B5EF4-FFF2-40B4-BE49-F238E27FC236}">
-                <a16:creationId xmlns:a16="http://schemas.microsoft.com/office/drawing/2014/main" id="{6B9E0A35-042D-A25A-CCE6-2CD071E1626E}"/>
-              </a:ext>
-            </a:extLst>
-          </p:cNvPr>
-          <p:cNvSpPr>
-            <a:spLocks noGrp="1"/>
-          </p:cNvSpPr>
-          <p:nvPr>
-            <p:ph type="subTitle" idx="1"/>
-          </p:nvPr>
-        </p:nvSpPr>
-        <p:spPr>
-          <a:xfrm>
-            <a:off x="1524000" y="1662023"/>
-            <a:ext cx="9144000" cy="1570007"/>
-          </a:xfrm>
-        </p:spPr>
-        <p:txBody>
-          <a:bodyPr>
-            <a:noAutofit/>
-          </a:bodyPr>
-          <a:lstStyle/>
-          <a:p>
-            <a:pPr marL="285750" indent="-285750" algn="l">
-              <a:buFont typeface="Arial" panose="020B0604020202020204" pitchFamily="34" charset="0"/>
-              <a:buChar char="•"/>
-            </a:pPr>
-            <a:r>
-              <a:rPr lang="en-US" sz="1600" dirty="0">
-                <a:solidFill>
-                  <a:srgbClr val="FFE81E"/>
-                </a:solidFill>
-                <a:latin typeface="StarJedi Special Edition" panose="040B0000000000000000" pitchFamily="82" charset="0"/>
-              </a:rPr>
-              <a:t>Main: the central menu of the game</a:t>
-            </a:r>
-          </a:p>
-          <a:p>
-            <a:pPr marL="285750" indent="-285750" algn="l">
-              <a:buFont typeface="Arial" panose="020B0604020202020204" pitchFamily="34" charset="0"/>
-              <a:buChar char="•"/>
-            </a:pPr>
-            <a:r>
-              <a:rPr lang="en-US" sz="1600" dirty="0">
-                <a:solidFill>
-                  <a:srgbClr val="FFE81E"/>
-                </a:solidFill>
-                <a:latin typeface="StarJedi Special Edition" panose="040B0000000000000000" pitchFamily="82" charset="0"/>
-              </a:rPr>
-              <a:t>Levels: the levels of the game</a:t>
-            </a:r>
-          </a:p>
-          <a:p>
-            <a:pPr marL="285750" indent="-285750" algn="l">
-              <a:buFont typeface="Arial" panose="020B0604020202020204" pitchFamily="34" charset="0"/>
-              <a:buChar char="•"/>
-            </a:pPr>
-            <a:r>
-              <a:rPr lang="en-US" sz="1600" dirty="0">
-                <a:solidFill>
-                  <a:srgbClr val="FFE81E"/>
-                </a:solidFill>
-                <a:latin typeface="StarJedi Special Edition" panose="040B0000000000000000" pitchFamily="82" charset="0"/>
-              </a:rPr>
-              <a:t>Score: the best completion time per level</a:t>
-            </a:r>
-          </a:p>
-          <a:p>
-            <a:pPr marL="285750" indent="-285750" algn="l">
-              <a:buFont typeface="Arial" panose="020B0604020202020204" pitchFamily="34" charset="0"/>
-              <a:buChar char="•"/>
-            </a:pPr>
-            <a:r>
-              <a:rPr lang="en-US" sz="1600" dirty="0">
-                <a:solidFill>
-                  <a:srgbClr val="FFE81E"/>
-                </a:solidFill>
-                <a:latin typeface="StarJedi Special Edition" panose="040B0000000000000000" pitchFamily="82" charset="0"/>
-              </a:rPr>
-              <a:t>Guide: the instructions of the game</a:t>
-            </a:r>
-          </a:p>
-        </p:txBody>
-      </p:sp>
-    </p:spTree>
-    <p:extLst>
-      <p:ext uri="{BB962C8B-B14F-4D97-AF65-F5344CB8AC3E}">
-        <p14:creationId xmlns:p14="http://schemas.microsoft.com/office/powerpoint/2010/main" val="3923346698"/>
-      </p:ext>
-    </p:extLst>
-  </p:cSld>
-  <p:clrMapOvr>
-    <a:masterClrMapping/>
-  </p:clrMapOvr>
-</p:sld>
-</file>
-
-<file path=ppt/slides/slide9.xml><?xml version="1.0" encoding="utf-8"?>
-<p:sld xmlns:a="http://schemas.openxmlformats.org/drawingml/2006/main" xmlns:r="http://schemas.openxmlformats.org/officeDocument/2006/relationships" xmlns:p="http://schemas.openxmlformats.org/presentationml/2006/main">
-  <p:cSld>
-    <p:bg>
-      <p:bgPr>
-        <a:blipFill dpi="0" rotWithShape="1">
-          <a:blip r:embed="rId2">
-            <a:lum/>
-          </a:blip>
-          <a:srcRect/>
-          <a:stretch>
-            <a:fillRect/>
-          </a:stretch>
-        </a:blipFill>
-        <a:effectLst/>
-      </p:bgPr>
-    </p:bg>
-    <p:spTree>
-      <p:nvGrpSpPr>
-        <p:cNvPr id="1" name="">
-          <a:extLst>
-            <a:ext uri="{FF2B5EF4-FFF2-40B4-BE49-F238E27FC236}">
-              <a16:creationId xmlns:a16="http://schemas.microsoft.com/office/drawing/2014/main" id="{B39CFBCF-AAA2-08F4-53A9-1E9F369C0775}"/>
-            </a:ext>
-          </a:extLst>
-        </p:cNvPr>
-        <p:cNvGrpSpPr/>
-        <p:nvPr/>
-      </p:nvGrpSpPr>
-      <p:grpSpPr>
-        <a:xfrm>
-          <a:off x="0" y="0"/>
-          <a:ext cx="0" cy="0"/>
-          <a:chOff x="0" y="0"/>
-          <a:chExt cx="0" cy="0"/>
-        </a:xfrm>
-      </p:grpSpPr>
-      <p:sp>
-        <p:nvSpPr>
-          <p:cNvPr id="2" name="Title 1">
-            <a:extLst>
-              <a:ext uri="{FF2B5EF4-FFF2-40B4-BE49-F238E27FC236}">
-                <a16:creationId xmlns:a16="http://schemas.microsoft.com/office/drawing/2014/main" id="{4CE7844D-8909-180A-F9D6-9A922608DDBF}"/>
-              </a:ext>
-            </a:extLst>
-          </p:cNvPr>
-          <p:cNvSpPr>
-            <a:spLocks noGrp="1"/>
-          </p:cNvSpPr>
-          <p:nvPr>
-            <p:ph type="ctrTitle"/>
-          </p:nvPr>
-        </p:nvSpPr>
-        <p:spPr>
-          <a:xfrm>
-            <a:off x="1524000" y="1122363"/>
-            <a:ext cx="9144000" cy="477837"/>
-          </a:xfrm>
-        </p:spPr>
-        <p:txBody>
-          <a:bodyPr>
-            <a:noAutofit/>
-          </a:bodyPr>
-          <a:lstStyle/>
-          <a:p>
-            <a:r>
-              <a:rPr lang="en-US" sz="3200" dirty="0">
-                <a:solidFill>
-                  <a:srgbClr val="FFE81E"/>
-                </a:solidFill>
-                <a:latin typeface="StarJedi Special Edition" panose="040B0000000000000000" pitchFamily="82" charset="0"/>
-              </a:rPr>
-              <a:t>Game features</a:t>
-            </a:r>
-          </a:p>
-        </p:txBody>
-      </p:sp>
-      <p:sp>
-        <p:nvSpPr>
-          <p:cNvPr id="3" name="Subtitle 2">
-            <a:extLst>
-              <a:ext uri="{FF2B5EF4-FFF2-40B4-BE49-F238E27FC236}">
-                <a16:creationId xmlns:a16="http://schemas.microsoft.com/office/drawing/2014/main" id="{04B5BDF7-C132-63EF-A0D5-F5F69FEBE7C0}"/>
-              </a:ext>
-            </a:extLst>
-          </p:cNvPr>
-          <p:cNvSpPr>
-            <a:spLocks noGrp="1"/>
-          </p:cNvSpPr>
-          <p:nvPr>
-            <p:ph type="subTitle" idx="1"/>
-          </p:nvPr>
-        </p:nvSpPr>
-        <p:spPr>
-          <a:xfrm>
-            <a:off x="1524000" y="1662023"/>
-            <a:ext cx="9144000" cy="4330460"/>
-          </a:xfrm>
-        </p:spPr>
-        <p:txBody>
-          <a:bodyPr>
-            <a:noAutofit/>
-          </a:bodyPr>
-          <a:lstStyle/>
-          <a:p>
-            <a:pPr marL="285750" indent="-285750" algn="l">
-              <a:buFont typeface="Arial" panose="020B0604020202020204" pitchFamily="34" charset="0"/>
-              <a:buChar char="•"/>
-            </a:pPr>
-            <a:r>
-              <a:rPr lang="en-US" sz="1600" dirty="0">
-                <a:solidFill>
-                  <a:srgbClr val="FFE81E"/>
-                </a:solidFill>
-                <a:latin typeface="StarJedi Special Edition" panose="040B0000000000000000" pitchFamily="82" charset="0"/>
-              </a:rPr>
-              <a:t>Smooth music transition between scenes with a global audio stream player</a:t>
-            </a:r>
-          </a:p>
-          <a:p>
-            <a:pPr marL="285750" indent="-285750" algn="l">
-              <a:buFont typeface="Arial" panose="020B0604020202020204" pitchFamily="34" charset="0"/>
-              <a:buChar char="•"/>
-            </a:pPr>
-            <a:r>
-              <a:rPr lang="en-US" sz="1600" dirty="0">
-                <a:solidFill>
-                  <a:srgbClr val="FFE81E"/>
-                </a:solidFill>
-                <a:latin typeface="StarJedi Special Edition" panose="040B0000000000000000" pitchFamily="82" charset="0"/>
-              </a:rPr>
-              <a:t>menu video playback for a background motion effect to imitate the hyper speed</a:t>
-            </a:r>
-          </a:p>
-          <a:p>
-            <a:pPr marL="285750" indent="-285750" algn="l">
-              <a:buFont typeface="Arial" panose="020B0604020202020204" pitchFamily="34" charset="0"/>
-              <a:buChar char="•"/>
-            </a:pPr>
-            <a:r>
-              <a:rPr lang="en-US" sz="1600" dirty="0">
-                <a:solidFill>
-                  <a:srgbClr val="FFE81E"/>
-                </a:solidFill>
-                <a:latin typeface="StarJedi Special Edition" panose="040B0000000000000000" pitchFamily="82" charset="0"/>
-              </a:rPr>
-              <a:t>Save and load stats to/from file “</a:t>
-            </a:r>
-            <a:r>
-              <a:rPr lang="en-US" sz="1600" dirty="0" err="1">
-                <a:solidFill>
-                  <a:srgbClr val="FFE81E"/>
-                </a:solidFill>
-                <a:latin typeface="StarJedi Special Edition" panose="040B0000000000000000" pitchFamily="82" charset="0"/>
-              </a:rPr>
-              <a:t>savestats.bin</a:t>
-            </a:r>
-            <a:r>
-              <a:rPr lang="en-US" sz="1600" dirty="0">
-                <a:solidFill>
-                  <a:srgbClr val="FFE81E"/>
-                </a:solidFill>
-                <a:latin typeface="StarJedi Special Edition" panose="040B0000000000000000" pitchFamily="82" charset="0"/>
-              </a:rPr>
-              <a:t>”</a:t>
-            </a:r>
-          </a:p>
-          <a:p>
-            <a:pPr marL="285750" indent="-285750" algn="l">
-              <a:buFont typeface="Arial" panose="020B0604020202020204" pitchFamily="34" charset="0"/>
-              <a:buChar char="•"/>
-            </a:pPr>
-            <a:r>
-              <a:rPr lang="en-US" sz="1600" dirty="0">
-                <a:solidFill>
-                  <a:srgbClr val="FFE81E"/>
-                </a:solidFill>
-                <a:latin typeface="StarJedi Special Edition" panose="040B0000000000000000" pitchFamily="82" charset="0"/>
-              </a:rPr>
-              <a:t>Global signal for enemy shooting in order to be async</a:t>
-            </a:r>
-          </a:p>
-          <a:p>
-            <a:pPr marL="285750" indent="-285750" algn="l">
-              <a:buFont typeface="Arial" panose="020B0604020202020204" pitchFamily="34" charset="0"/>
-              <a:buChar char="•"/>
-            </a:pPr>
-            <a:r>
-              <a:rPr lang="en-US" sz="1600" dirty="0">
-                <a:solidFill>
-                  <a:srgbClr val="FFE81E"/>
-                </a:solidFill>
-                <a:latin typeface="StarJedi Special Edition" panose="040B0000000000000000" pitchFamily="82" charset="0"/>
-              </a:rPr>
-              <a:t>Timer utilities:</a:t>
-            </a:r>
-          </a:p>
-          <a:p>
-            <a:pPr marL="742950" lvl="1" indent="-285750" algn="l">
-              <a:buFont typeface="+mj-lt"/>
-              <a:buAutoNum type="arabicPeriod"/>
-            </a:pPr>
-            <a:r>
-              <a:rPr lang="en-US" sz="1200" dirty="0">
-                <a:solidFill>
-                  <a:srgbClr val="FFE81E"/>
-                </a:solidFill>
-                <a:latin typeface="StarJedi Special Edition" panose="040B0000000000000000" pitchFamily="82" charset="0"/>
-              </a:rPr>
-              <a:t>Player cannot receive damage immediately (damage cooldown)</a:t>
-            </a:r>
-          </a:p>
-          <a:p>
-            <a:pPr marL="742950" lvl="1" indent="-285750" algn="l">
-              <a:buFont typeface="+mj-lt"/>
-              <a:buAutoNum type="arabicPeriod"/>
-            </a:pPr>
-            <a:r>
-              <a:rPr lang="en-US" sz="1200" dirty="0">
-                <a:solidFill>
-                  <a:srgbClr val="FFE81E"/>
-                </a:solidFill>
-                <a:latin typeface="StarJedi Special Edition" panose="040B0000000000000000" pitchFamily="82" charset="0"/>
-              </a:rPr>
-              <a:t>Enemies shoot on cooldown (shot cooldown)</a:t>
-            </a:r>
-          </a:p>
-          <a:p>
-            <a:pPr marL="742950" lvl="1" indent="-285750" algn="l">
-              <a:buFont typeface="+mj-lt"/>
-              <a:buAutoNum type="arabicPeriod"/>
-            </a:pPr>
-            <a:r>
-              <a:rPr lang="en-US" sz="1200" dirty="0">
-                <a:solidFill>
-                  <a:srgbClr val="FFE81E"/>
-                </a:solidFill>
-                <a:latin typeface="StarJedi Special Edition" panose="040B0000000000000000" pitchFamily="82" charset="0"/>
-              </a:rPr>
-              <a:t>Beam disappears after 1 second of being fired</a:t>
-            </a:r>
-          </a:p>
-          <a:p>
-            <a:pPr marL="742950" lvl="1" indent="-285750" algn="l">
-              <a:buFont typeface="+mj-lt"/>
-              <a:buAutoNum type="arabicPeriod"/>
-            </a:pPr>
-            <a:r>
-              <a:rPr lang="en-US" sz="1200" dirty="0">
-                <a:solidFill>
-                  <a:srgbClr val="FFE81E"/>
-                </a:solidFill>
-                <a:latin typeface="StarJedi Special Edition" panose="040B0000000000000000" pitchFamily="82" charset="0"/>
-              </a:rPr>
-              <a:t>Level 2 countdown</a:t>
-            </a:r>
-          </a:p>
-          <a:p>
-            <a:pPr marL="742950" lvl="1" indent="-285750" algn="l">
-              <a:buFont typeface="+mj-lt"/>
-              <a:buAutoNum type="arabicPeriod"/>
-            </a:pPr>
-            <a:endParaRPr lang="en-US" sz="1600" dirty="0">
-              <a:solidFill>
-                <a:srgbClr val="FFE81E"/>
-              </a:solidFill>
-              <a:latin typeface="StarJedi Special Edition" panose="040B0000000000000000" pitchFamily="82" charset="0"/>
-            </a:endParaRPr>
-          </a:p>
-        </p:txBody>
-      </p:sp>
-    </p:spTree>
-    <p:extLst>
-      <p:ext uri="{BB962C8B-B14F-4D97-AF65-F5344CB8AC3E}">
-        <p14:creationId xmlns:p14="http://schemas.microsoft.com/office/powerpoint/2010/main" val="1816965595"/>
       </p:ext>
     </p:extLst>
   </p:cSld>

</xml_diff>

<commit_message>
Creating the executable + README and Presentation update
</commit_message>
<xml_diff>
--- a/Project Presentation/3140196 - Multimedia technology project presentation.pptx
+++ b/Project Presentation/3140196 - Multimedia technology project presentation.pptx
@@ -14,7 +14,8 @@
     <p:sldId id="263" r:id="rId8"/>
     <p:sldId id="264" r:id="rId9"/>
     <p:sldId id="259" r:id="rId10"/>
-    <p:sldId id="265" r:id="rId11"/>
+    <p:sldId id="266" r:id="rId11"/>
+    <p:sldId id="265" r:id="rId12"/>
   </p:sldIdLst>
   <p:sldSz cx="12192000" cy="6858000"/>
   <p:notesSz cx="6858000" cy="9144000"/>
@@ -268,7 +269,7 @@
           <a:p>
             <a:fld id="{F1A87ED4-A69C-400D-BB16-D0DD08EF48BF}" type="datetimeFigureOut">
               <a:rPr lang="en-US" smtClean="0"/>
-              <a:t>1/11/2025</a:t>
+              <a:t>1/12/2025</a:t>
             </a:fld>
             <a:endParaRPr lang="en-US"/>
           </a:p>
@@ -466,7 +467,7 @@
           <a:p>
             <a:fld id="{F1A87ED4-A69C-400D-BB16-D0DD08EF48BF}" type="datetimeFigureOut">
               <a:rPr lang="en-US" smtClean="0"/>
-              <a:t>1/11/2025</a:t>
+              <a:t>1/12/2025</a:t>
             </a:fld>
             <a:endParaRPr lang="en-US"/>
           </a:p>
@@ -674,7 +675,7 @@
           <a:p>
             <a:fld id="{F1A87ED4-A69C-400D-BB16-D0DD08EF48BF}" type="datetimeFigureOut">
               <a:rPr lang="en-US" smtClean="0"/>
-              <a:t>1/11/2025</a:t>
+              <a:t>1/12/2025</a:t>
             </a:fld>
             <a:endParaRPr lang="en-US"/>
           </a:p>
@@ -872,7 +873,7 @@
           <a:p>
             <a:fld id="{F1A87ED4-A69C-400D-BB16-D0DD08EF48BF}" type="datetimeFigureOut">
               <a:rPr lang="en-US" smtClean="0"/>
-              <a:t>1/11/2025</a:t>
+              <a:t>1/12/2025</a:t>
             </a:fld>
             <a:endParaRPr lang="en-US"/>
           </a:p>
@@ -1147,7 +1148,7 @@
           <a:p>
             <a:fld id="{F1A87ED4-A69C-400D-BB16-D0DD08EF48BF}" type="datetimeFigureOut">
               <a:rPr lang="en-US" smtClean="0"/>
-              <a:t>1/11/2025</a:t>
+              <a:t>1/12/2025</a:t>
             </a:fld>
             <a:endParaRPr lang="en-US"/>
           </a:p>
@@ -1412,7 +1413,7 @@
           <a:p>
             <a:fld id="{F1A87ED4-A69C-400D-BB16-D0DD08EF48BF}" type="datetimeFigureOut">
               <a:rPr lang="en-US" smtClean="0"/>
-              <a:t>1/11/2025</a:t>
+              <a:t>1/12/2025</a:t>
             </a:fld>
             <a:endParaRPr lang="en-US"/>
           </a:p>
@@ -1824,7 +1825,7 @@
           <a:p>
             <a:fld id="{F1A87ED4-A69C-400D-BB16-D0DD08EF48BF}" type="datetimeFigureOut">
               <a:rPr lang="en-US" smtClean="0"/>
-              <a:t>1/11/2025</a:t>
+              <a:t>1/12/2025</a:t>
             </a:fld>
             <a:endParaRPr lang="en-US"/>
           </a:p>
@@ -1965,7 +1966,7 @@
           <a:p>
             <a:fld id="{F1A87ED4-A69C-400D-BB16-D0DD08EF48BF}" type="datetimeFigureOut">
               <a:rPr lang="en-US" smtClean="0"/>
-              <a:t>1/11/2025</a:t>
+              <a:t>1/12/2025</a:t>
             </a:fld>
             <a:endParaRPr lang="en-US"/>
           </a:p>
@@ -2078,7 +2079,7 @@
           <a:p>
             <a:fld id="{F1A87ED4-A69C-400D-BB16-D0DD08EF48BF}" type="datetimeFigureOut">
               <a:rPr lang="en-US" smtClean="0"/>
-              <a:t>1/11/2025</a:t>
+              <a:t>1/12/2025</a:t>
             </a:fld>
             <a:endParaRPr lang="en-US"/>
           </a:p>
@@ -2389,7 +2390,7 @@
           <a:p>
             <a:fld id="{F1A87ED4-A69C-400D-BB16-D0DD08EF48BF}" type="datetimeFigureOut">
               <a:rPr lang="en-US" smtClean="0"/>
-              <a:t>1/11/2025</a:t>
+              <a:t>1/12/2025</a:t>
             </a:fld>
             <a:endParaRPr lang="en-US"/>
           </a:p>
@@ -2677,7 +2678,7 @@
           <a:p>
             <a:fld id="{F1A87ED4-A69C-400D-BB16-D0DD08EF48BF}" type="datetimeFigureOut">
               <a:rPr lang="en-US" smtClean="0"/>
-              <a:t>1/11/2025</a:t>
+              <a:t>1/12/2025</a:t>
             </a:fld>
             <a:endParaRPr lang="en-US"/>
           </a:p>
@@ -2927,7 +2928,7 @@
           <a:p>
             <a:fld id="{F1A87ED4-A69C-400D-BB16-D0DD08EF48BF}" type="datetimeFigureOut">
               <a:rPr lang="en-US" smtClean="0"/>
-              <a:t>1/11/2025</a:t>
+              <a:t>1/12/2025</a:t>
             </a:fld>
             <a:endParaRPr lang="en-US"/>
           </a:p>
@@ -3488,6 +3489,296 @@
         <p:cNvPr id="1" name="">
           <a:extLst>
             <a:ext uri="{FF2B5EF4-FFF2-40B4-BE49-F238E27FC236}">
+              <a16:creationId xmlns:a16="http://schemas.microsoft.com/office/drawing/2014/main" id="{FF2DCA3A-1509-BA18-92BA-F6FFE6C897B4}"/>
+            </a:ext>
+          </a:extLst>
+        </p:cNvPr>
+        <p:cNvGrpSpPr/>
+        <p:nvPr/>
+      </p:nvGrpSpPr>
+      <p:grpSpPr>
+        <a:xfrm>
+          <a:off x="0" y="0"/>
+          <a:ext cx="0" cy="0"/>
+          <a:chOff x="0" y="0"/>
+          <a:chExt cx="0" cy="0"/>
+        </a:xfrm>
+      </p:grpSpPr>
+      <p:sp>
+        <p:nvSpPr>
+          <p:cNvPr id="2" name="Title 1">
+            <a:extLst>
+              <a:ext uri="{FF2B5EF4-FFF2-40B4-BE49-F238E27FC236}">
+                <a16:creationId xmlns:a16="http://schemas.microsoft.com/office/drawing/2014/main" id="{D2ACFBEA-FBA8-8251-82D2-F3998B79EEE3}"/>
+              </a:ext>
+            </a:extLst>
+          </p:cNvPr>
+          <p:cNvSpPr>
+            <a:spLocks noGrp="1"/>
+          </p:cNvSpPr>
+          <p:nvPr>
+            <p:ph type="ctrTitle"/>
+          </p:nvPr>
+        </p:nvSpPr>
+        <p:spPr>
+          <a:xfrm>
+            <a:off x="1524000" y="1122363"/>
+            <a:ext cx="9144000" cy="477837"/>
+          </a:xfrm>
+        </p:spPr>
+        <p:txBody>
+          <a:bodyPr>
+            <a:noAutofit/>
+          </a:bodyPr>
+          <a:lstStyle/>
+          <a:p>
+            <a:r>
+              <a:rPr lang="en-US" sz="3200" dirty="0">
+                <a:solidFill>
+                  <a:srgbClr val="FFE81E"/>
+                </a:solidFill>
+                <a:latin typeface="StarJedi Special Edition" panose="040B0000000000000000" pitchFamily="82" charset="0"/>
+              </a:rPr>
+              <a:t>Source code - executable</a:t>
+            </a:r>
+          </a:p>
+        </p:txBody>
+      </p:sp>
+      <p:sp>
+        <p:nvSpPr>
+          <p:cNvPr id="3" name="Subtitle 2">
+            <a:extLst>
+              <a:ext uri="{FF2B5EF4-FFF2-40B4-BE49-F238E27FC236}">
+                <a16:creationId xmlns:a16="http://schemas.microsoft.com/office/drawing/2014/main" id="{89425688-9AD2-1B91-1C66-C2B34DACF4A6}"/>
+              </a:ext>
+            </a:extLst>
+          </p:cNvPr>
+          <p:cNvSpPr>
+            <a:spLocks noGrp="1"/>
+          </p:cNvSpPr>
+          <p:nvPr>
+            <p:ph type="subTitle" idx="1"/>
+          </p:nvPr>
+        </p:nvSpPr>
+        <p:spPr>
+          <a:xfrm>
+            <a:off x="1524000" y="1662023"/>
+            <a:ext cx="9144000" cy="4330460"/>
+          </a:xfrm>
+        </p:spPr>
+        <p:txBody>
+          <a:bodyPr>
+            <a:noAutofit/>
+          </a:bodyPr>
+          <a:lstStyle/>
+          <a:p>
+            <a:pPr marL="285750" indent="-285750" algn="l">
+              <a:buFont typeface="Arial" panose="020B0604020202020204" pitchFamily="34" charset="0"/>
+              <a:buChar char="•"/>
+            </a:pPr>
+            <a:r>
+              <a:rPr lang="en-US" sz="1600" dirty="0">
+                <a:solidFill>
+                  <a:srgbClr val="FFE81E"/>
+                </a:solidFill>
+                <a:latin typeface="StarJedi Special Edition" panose="040B0000000000000000" pitchFamily="82" charset="0"/>
+              </a:rPr>
+              <a:t>The source code for the game can be found here: </a:t>
+            </a:r>
+            <a:r>
+              <a:rPr lang="en-US" sz="1600" dirty="0" err="1">
+                <a:solidFill>
+                  <a:srgbClr val="20C3FF"/>
+                </a:solidFill>
+                <a:latin typeface="StarJedi Special Edition" panose="040B0000000000000000" pitchFamily="82" charset="0"/>
+                <a:hlinkClick r:id="rId3">
+                  <a:extLst>
+                    <a:ext uri="{A12FA001-AC4F-418D-AE19-62706E023703}">
+                      <ahyp:hlinkClr xmlns:ahyp="http://schemas.microsoft.com/office/drawing/2018/hyperlinkcolor" val="tx"/>
+                    </a:ext>
+                  </a:extLst>
+                </a:hlinkClick>
+              </a:rPr>
+              <a:t>github</a:t>
+            </a:r>
+            <a:r>
+              <a:rPr lang="en-US" sz="1600" dirty="0">
+                <a:solidFill>
+                  <a:srgbClr val="20C3FF"/>
+                </a:solidFill>
+                <a:latin typeface="StarJedi Special Edition" panose="040B0000000000000000" pitchFamily="82" charset="0"/>
+                <a:hlinkClick r:id="rId3">
+                  <a:extLst>
+                    <a:ext uri="{A12FA001-AC4F-418D-AE19-62706E023703}">
+                      <ahyp:hlinkClr xmlns:ahyp="http://schemas.microsoft.com/office/drawing/2018/hyperlinkcolor" val="tx"/>
+                    </a:ext>
+                  </a:extLst>
+                </a:hlinkClick>
+              </a:rPr>
+              <a:t> repo</a:t>
+            </a:r>
+            <a:r>
+              <a:rPr lang="en-US" sz="1600" dirty="0">
+                <a:solidFill>
+                  <a:srgbClr val="20C3FF"/>
+                </a:solidFill>
+                <a:latin typeface="StarJedi Special Edition" panose="040B0000000000000000" pitchFamily="82" charset="0"/>
+              </a:rPr>
+              <a:t> </a:t>
+            </a:r>
+            <a:r>
+              <a:rPr lang="en-US" sz="1600" dirty="0">
+                <a:solidFill>
+                  <a:srgbClr val="FFE81E"/>
+                </a:solidFill>
+                <a:latin typeface="StarJedi Special Edition" panose="040B0000000000000000" pitchFamily="82" charset="0"/>
+              </a:rPr>
+              <a:t>- </a:t>
+            </a:r>
+            <a:r>
+              <a:rPr lang="en-US" sz="1600" dirty="0" err="1">
+                <a:solidFill>
+                  <a:srgbClr val="20C3FF"/>
+                </a:solidFill>
+                <a:latin typeface="StarJedi Special Edition" panose="040B0000000000000000" pitchFamily="82" charset="0"/>
+                <a:hlinkClick r:id="rId4">
+                  <a:extLst>
+                    <a:ext uri="{A12FA001-AC4F-418D-AE19-62706E023703}">
+                      <ahyp:hlinkClr xmlns:ahyp="http://schemas.microsoft.com/office/drawing/2018/hyperlinkcolor" val="tx"/>
+                    </a:ext>
+                  </a:extLst>
+                </a:hlinkClick>
+              </a:rPr>
+              <a:t>onedrive</a:t>
+            </a:r>
+            <a:endParaRPr lang="en-US" sz="1600" dirty="0">
+              <a:solidFill>
+                <a:srgbClr val="20C3FF"/>
+              </a:solidFill>
+              <a:latin typeface="StarJedi Special Edition" panose="040B0000000000000000" pitchFamily="82" charset="0"/>
+            </a:endParaRPr>
+          </a:p>
+          <a:p>
+            <a:pPr marL="285750" indent="-285750" algn="l">
+              <a:buFont typeface="Arial" panose="020B0604020202020204" pitchFamily="34" charset="0"/>
+              <a:buChar char="•"/>
+            </a:pPr>
+            <a:r>
+              <a:rPr lang="en-US" sz="1600" dirty="0">
+                <a:solidFill>
+                  <a:srgbClr val="FFE81E"/>
+                </a:solidFill>
+                <a:latin typeface="StarJedi Special Edition" panose="040B0000000000000000" pitchFamily="82" charset="0"/>
+              </a:rPr>
+              <a:t>Run the project by opening the </a:t>
+            </a:r>
+            <a:r>
+              <a:rPr lang="en-US" sz="1600" dirty="0" err="1">
+                <a:solidFill>
+                  <a:srgbClr val="FFE81E"/>
+                </a:solidFill>
+                <a:latin typeface="StarJedi Special Edition" panose="040B0000000000000000" pitchFamily="82" charset="0"/>
+              </a:rPr>
+              <a:t>godot</a:t>
+            </a:r>
+            <a:r>
+              <a:rPr lang="en-US" sz="1600" dirty="0">
+                <a:solidFill>
+                  <a:srgbClr val="FFE81E"/>
+                </a:solidFill>
+                <a:latin typeface="StarJedi Special Edition" panose="040B0000000000000000" pitchFamily="82" charset="0"/>
+              </a:rPr>
+              <a:t> project file, while having already the </a:t>
+            </a:r>
+            <a:r>
+              <a:rPr lang="en-US" sz="1600" dirty="0" err="1">
+                <a:solidFill>
+                  <a:srgbClr val="FFE81E"/>
+                </a:solidFill>
+                <a:latin typeface="StarJedi Special Edition" panose="040B0000000000000000" pitchFamily="82" charset="0"/>
+              </a:rPr>
+              <a:t>godot</a:t>
+            </a:r>
+            <a:r>
+              <a:rPr lang="en-US" sz="1600" dirty="0">
+                <a:solidFill>
+                  <a:srgbClr val="FFE81E"/>
+                </a:solidFill>
+                <a:latin typeface="StarJedi Special Edition" panose="040B0000000000000000" pitchFamily="82" charset="0"/>
+              </a:rPr>
+              <a:t> engine installed</a:t>
+            </a:r>
+          </a:p>
+          <a:p>
+            <a:pPr marL="285750" indent="-285750" algn="l">
+              <a:buFont typeface="Arial" panose="020B0604020202020204" pitchFamily="34" charset="0"/>
+              <a:buChar char="•"/>
+            </a:pPr>
+            <a:r>
+              <a:rPr lang="en-US" sz="1600" dirty="0">
+                <a:solidFill>
+                  <a:srgbClr val="FFE81E"/>
+                </a:solidFill>
+                <a:latin typeface="StarJedi Special Edition" panose="040B0000000000000000" pitchFamily="82" charset="0"/>
+              </a:rPr>
+              <a:t>Run the executable created by the export process of the engine using an </a:t>
+            </a:r>
+            <a:r>
+              <a:rPr lang="en-US" sz="1600" dirty="0" err="1">
+                <a:solidFill>
+                  <a:srgbClr val="FFE81E"/>
+                </a:solidFill>
+                <a:latin typeface="StarJedi Special Edition" panose="040B0000000000000000" pitchFamily="82" charset="0"/>
+              </a:rPr>
+              <a:t>openssl</a:t>
+            </a:r>
+            <a:r>
+              <a:rPr lang="en-US" sz="1600" dirty="0">
+                <a:solidFill>
+                  <a:srgbClr val="FFE81E"/>
+                </a:solidFill>
+                <a:latin typeface="StarJedi Special Edition" panose="040B0000000000000000" pitchFamily="82" charset="0"/>
+              </a:rPr>
+              <a:t> self-signed certificate. (script can be provided if requested)</a:t>
+            </a:r>
+          </a:p>
+        </p:txBody>
+      </p:sp>
+    </p:spTree>
+    <p:extLst>
+      <p:ext uri="{BB962C8B-B14F-4D97-AF65-F5344CB8AC3E}">
+        <p14:creationId xmlns:p14="http://schemas.microsoft.com/office/powerpoint/2010/main" val="2894549016"/>
+      </p:ext>
+    </p:extLst>
+  </p:cSld>
+  <p:clrMapOvr>
+    <a:masterClrMapping/>
+  </p:clrMapOvr>
+</p:sld>
+</file>
+
+<file path=ppt/slides/slide11.xml><?xml version="1.0" encoding="utf-8"?>
+<p:sld xmlns:a="http://schemas.openxmlformats.org/drawingml/2006/main" xmlns:r="http://schemas.openxmlformats.org/officeDocument/2006/relationships" xmlns:p="http://schemas.openxmlformats.org/presentationml/2006/main">
+  <p:cSld>
+    <p:bg>
+      <p:bgPr>
+        <a:blipFill dpi="0" rotWithShape="1">
+          <a:blip r:embed="rId2">
+            <a:lum/>
+          </a:blip>
+          <a:srcRect/>
+          <a:stretch>
+            <a:fillRect/>
+          </a:stretch>
+        </a:blipFill>
+        <a:effectLst/>
+      </p:bgPr>
+    </p:bg>
+    <p:spTree>
+      <p:nvGrpSpPr>
+        <p:cNvPr id="1" name="">
+          <a:extLst>
+            <a:ext uri="{FF2B5EF4-FFF2-40B4-BE49-F238E27FC236}">
               <a16:creationId xmlns:a16="http://schemas.microsoft.com/office/drawing/2014/main" id="{D4A6B037-2F2B-C495-71E2-3C32DD3D766B}"/>
             </a:ext>
           </a:extLst>
@@ -3656,7 +3947,9 @@
           </a:xfrm>
         </p:spPr>
         <p:txBody>
-          <a:bodyPr/>
+          <a:bodyPr>
+            <a:normAutofit/>
+          </a:bodyPr>
           <a:lstStyle/>
           <a:p>
             <a:pPr marL="457200" indent="-457200" algn="l">
@@ -3760,7 +4053,22 @@
                 </a:solidFill>
                 <a:latin typeface="StarJedi Special Edition" panose="040B0000000000000000" pitchFamily="82" charset="0"/>
               </a:rPr>
-              <a:t>resources - Tools</a:t>
+              <a:t>Source code – executable</a:t>
+            </a:r>
+          </a:p>
+          <a:p>
+            <a:pPr marL="457200" indent="-457200" algn="l">
+              <a:buFont typeface="+mj-lt"/>
+              <a:buAutoNum type="arabicPeriod"/>
+            </a:pPr>
+            <a:r>
+              <a:rPr lang="en-US" dirty="0">
+                <a:solidFill>
+                  <a:srgbClr val="FFE81E"/>
+                </a:solidFill>
+                <a:latin typeface="StarJedi Special Edition" panose="040B0000000000000000" pitchFamily="82" charset="0"/>
+              </a:rPr>
+              <a:t>resources – Tools</a:t>
             </a:r>
           </a:p>
           <a:p>
@@ -3772,7 +4080,7 @@
                 </a:solidFill>
                 <a:latin typeface="StarJedi Special Edition" panose="040B0000000000000000" pitchFamily="82" charset="0"/>
               </a:rPr>
-              <a:t>8. questions</a:t>
+              <a:t>9. questions</a:t>
             </a:r>
           </a:p>
         </p:txBody>
@@ -5098,7 +5406,7 @@
                 </a:solidFill>
                 <a:latin typeface="StarJedi Special Edition" panose="040B0000000000000000" pitchFamily="82" charset="0"/>
               </a:rPr>
-              <a:t>Beam disappears after 1 second of being fired</a:t>
+              <a:t>Beam disappears after 1.5 second of being fired</a:t>
             </a:r>
           </a:p>
           <a:p>

</xml_diff>